<commit_message>
Added ingress controller and ingress resources.
</commit_message>
<xml_diff>
--- a/docs/microservice.pptx
+++ b/docs/microservice.pptx
@@ -4,10 +4,24 @@
   <p:sldMasterIdLst>
     <p:sldMasterId id="2147483648" r:id="rId1"/>
   </p:sldMasterIdLst>
+  <p:notesMasterIdLst>
+    <p:notesMasterId r:id="rId16"/>
+  </p:notesMasterIdLst>
   <p:sldIdLst>
     <p:sldId id="256" r:id="rId2"/>
-    <p:sldId id="257" r:id="rId3"/>
-    <p:sldId id="259" r:id="rId4"/>
+    <p:sldId id="264" r:id="rId3"/>
+    <p:sldId id="257" r:id="rId4"/>
+    <p:sldId id="259" r:id="rId5"/>
+    <p:sldId id="260" r:id="rId6"/>
+    <p:sldId id="262" r:id="rId7"/>
+    <p:sldId id="263" r:id="rId8"/>
+    <p:sldId id="266" r:id="rId9"/>
+    <p:sldId id="265" r:id="rId10"/>
+    <p:sldId id="267" r:id="rId11"/>
+    <p:sldId id="268" r:id="rId12"/>
+    <p:sldId id="269" r:id="rId13"/>
+    <p:sldId id="270" r:id="rId14"/>
+    <p:sldId id="271" r:id="rId15"/>
   </p:sldIdLst>
   <p:sldSz cx="9144000" cy="6858000" type="screen4x3"/>
   <p:notesSz cx="6858000" cy="9144000"/>
@@ -109,6 +123,456 @@
 </p:presentation>
 </file>
 
+<file path=ppt/notesMasters/notesMaster1.xml><?xml version="1.0" encoding="utf-8"?>
+<p:notesMaster xmlns:a="http://schemas.openxmlformats.org/drawingml/2006/main" xmlns:r="http://schemas.openxmlformats.org/officeDocument/2006/relationships" xmlns:p="http://schemas.openxmlformats.org/presentationml/2006/main">
+  <p:cSld>
+    <p:bg>
+      <p:bgRef idx="1001">
+        <a:schemeClr val="bg1"/>
+      </p:bgRef>
+    </p:bg>
+    <p:spTree>
+      <p:nvGrpSpPr>
+        <p:cNvPr id="1" name=""/>
+        <p:cNvGrpSpPr/>
+        <p:nvPr/>
+      </p:nvGrpSpPr>
+      <p:grpSpPr>
+        <a:xfrm>
+          <a:off x="0" y="0"/>
+          <a:ext cx="0" cy="0"/>
+          <a:chOff x="0" y="0"/>
+          <a:chExt cx="0" cy="0"/>
+        </a:xfrm>
+      </p:grpSpPr>
+      <p:sp>
+        <p:nvSpPr>
+          <p:cNvPr id="2" name="Header Placeholder 1"/>
+          <p:cNvSpPr>
+            <a:spLocks noGrp="1"/>
+          </p:cNvSpPr>
+          <p:nvPr>
+            <p:ph type="hdr" sz="quarter"/>
+          </p:nvPr>
+        </p:nvSpPr>
+        <p:spPr>
+          <a:xfrm>
+            <a:off x="0" y="0"/>
+            <a:ext cx="2971800" cy="457200"/>
+          </a:xfrm>
+          <a:prstGeom prst="rect">
+            <a:avLst/>
+          </a:prstGeom>
+        </p:spPr>
+        <p:txBody>
+          <a:bodyPr vert="horz" lIns="91440" tIns="45720" rIns="91440" bIns="45720" rtlCol="0"/>
+          <a:lstStyle>
+            <a:lvl1pPr algn="l">
+              <a:defRPr sz="1200"/>
+            </a:lvl1pPr>
+          </a:lstStyle>
+          <a:p>
+            <a:endParaRPr lang="en-IN"/>
+          </a:p>
+        </p:txBody>
+      </p:sp>
+      <p:sp>
+        <p:nvSpPr>
+          <p:cNvPr id="3" name="Date Placeholder 2"/>
+          <p:cNvSpPr>
+            <a:spLocks noGrp="1"/>
+          </p:cNvSpPr>
+          <p:nvPr>
+            <p:ph type="dt" idx="1"/>
+          </p:nvPr>
+        </p:nvSpPr>
+        <p:spPr>
+          <a:xfrm>
+            <a:off x="3884613" y="0"/>
+            <a:ext cx="2971800" cy="457200"/>
+          </a:xfrm>
+          <a:prstGeom prst="rect">
+            <a:avLst/>
+          </a:prstGeom>
+        </p:spPr>
+        <p:txBody>
+          <a:bodyPr vert="horz" lIns="91440" tIns="45720" rIns="91440" bIns="45720" rtlCol="0"/>
+          <a:lstStyle>
+            <a:lvl1pPr algn="r">
+              <a:defRPr sz="1200"/>
+            </a:lvl1pPr>
+          </a:lstStyle>
+          <a:p>
+            <a:fld id="{94514F1B-A05F-4070-B107-C2B688822473}" type="datetimeFigureOut">
+              <a:rPr lang="en-IN" smtClean="0"/>
+              <a:t>03-05-2023</a:t>
+            </a:fld>
+            <a:endParaRPr lang="en-IN"/>
+          </a:p>
+        </p:txBody>
+      </p:sp>
+      <p:sp>
+        <p:nvSpPr>
+          <p:cNvPr id="4" name="Slide Image Placeholder 3"/>
+          <p:cNvSpPr>
+            <a:spLocks noGrp="1" noRot="1" noChangeAspect="1"/>
+          </p:cNvSpPr>
+          <p:nvPr>
+            <p:ph type="sldImg" idx="2"/>
+          </p:nvPr>
+        </p:nvSpPr>
+        <p:spPr>
+          <a:xfrm>
+            <a:off x="1143000" y="685800"/>
+            <a:ext cx="4572000" cy="3429000"/>
+          </a:xfrm>
+          <a:prstGeom prst="rect">
+            <a:avLst/>
+          </a:prstGeom>
+          <a:noFill/>
+          <a:ln w="12700">
+            <a:solidFill>
+              <a:prstClr val="black"/>
+            </a:solidFill>
+          </a:ln>
+        </p:spPr>
+        <p:txBody>
+          <a:bodyPr vert="horz" lIns="91440" tIns="45720" rIns="91440" bIns="45720" rtlCol="0" anchor="ctr"/>
+          <a:lstStyle/>
+          <a:p>
+            <a:endParaRPr lang="en-IN"/>
+          </a:p>
+        </p:txBody>
+      </p:sp>
+      <p:sp>
+        <p:nvSpPr>
+          <p:cNvPr id="5" name="Notes Placeholder 4"/>
+          <p:cNvSpPr>
+            <a:spLocks noGrp="1"/>
+          </p:cNvSpPr>
+          <p:nvPr>
+            <p:ph type="body" sz="quarter" idx="3"/>
+          </p:nvPr>
+        </p:nvSpPr>
+        <p:spPr>
+          <a:xfrm>
+            <a:off x="685800" y="4343400"/>
+            <a:ext cx="5486400" cy="4114800"/>
+          </a:xfrm>
+          <a:prstGeom prst="rect">
+            <a:avLst/>
+          </a:prstGeom>
+        </p:spPr>
+        <p:txBody>
+          <a:bodyPr vert="horz" lIns="91440" tIns="45720" rIns="91440" bIns="45720" rtlCol="0"/>
+          <a:lstStyle/>
+          <a:p>
+            <a:pPr lvl="0"/>
+            <a:r>
+              <a:rPr lang="en-US" smtClean="0"/>
+              <a:t>Click to edit Master text styles</a:t>
+            </a:r>
+          </a:p>
+          <a:p>
+            <a:pPr lvl="1"/>
+            <a:r>
+              <a:rPr lang="en-US" smtClean="0"/>
+              <a:t>Second level</a:t>
+            </a:r>
+          </a:p>
+          <a:p>
+            <a:pPr lvl="2"/>
+            <a:r>
+              <a:rPr lang="en-US" smtClean="0"/>
+              <a:t>Third level</a:t>
+            </a:r>
+          </a:p>
+          <a:p>
+            <a:pPr lvl="3"/>
+            <a:r>
+              <a:rPr lang="en-US" smtClean="0"/>
+              <a:t>Fourth level</a:t>
+            </a:r>
+          </a:p>
+          <a:p>
+            <a:pPr lvl="4"/>
+            <a:r>
+              <a:rPr lang="en-US" smtClean="0"/>
+              <a:t>Fifth level</a:t>
+            </a:r>
+            <a:endParaRPr lang="en-IN"/>
+          </a:p>
+        </p:txBody>
+      </p:sp>
+      <p:sp>
+        <p:nvSpPr>
+          <p:cNvPr id="6" name="Footer Placeholder 5"/>
+          <p:cNvSpPr>
+            <a:spLocks noGrp="1"/>
+          </p:cNvSpPr>
+          <p:nvPr>
+            <p:ph type="ftr" sz="quarter" idx="4"/>
+          </p:nvPr>
+        </p:nvSpPr>
+        <p:spPr>
+          <a:xfrm>
+            <a:off x="0" y="8685213"/>
+            <a:ext cx="2971800" cy="457200"/>
+          </a:xfrm>
+          <a:prstGeom prst="rect">
+            <a:avLst/>
+          </a:prstGeom>
+        </p:spPr>
+        <p:txBody>
+          <a:bodyPr vert="horz" lIns="91440" tIns="45720" rIns="91440" bIns="45720" rtlCol="0" anchor="b"/>
+          <a:lstStyle>
+            <a:lvl1pPr algn="l">
+              <a:defRPr sz="1200"/>
+            </a:lvl1pPr>
+          </a:lstStyle>
+          <a:p>
+            <a:endParaRPr lang="en-IN"/>
+          </a:p>
+        </p:txBody>
+      </p:sp>
+      <p:sp>
+        <p:nvSpPr>
+          <p:cNvPr id="7" name="Slide Number Placeholder 6"/>
+          <p:cNvSpPr>
+            <a:spLocks noGrp="1"/>
+          </p:cNvSpPr>
+          <p:nvPr>
+            <p:ph type="sldNum" sz="quarter" idx="5"/>
+          </p:nvPr>
+        </p:nvSpPr>
+        <p:spPr>
+          <a:xfrm>
+            <a:off x="3884613" y="8685213"/>
+            <a:ext cx="2971800" cy="457200"/>
+          </a:xfrm>
+          <a:prstGeom prst="rect">
+            <a:avLst/>
+          </a:prstGeom>
+        </p:spPr>
+        <p:txBody>
+          <a:bodyPr vert="horz" lIns="91440" tIns="45720" rIns="91440" bIns="45720" rtlCol="0" anchor="b"/>
+          <a:lstStyle>
+            <a:lvl1pPr algn="r">
+              <a:defRPr sz="1200"/>
+            </a:lvl1pPr>
+          </a:lstStyle>
+          <a:p>
+            <a:fld id="{6F4109A8-805D-4E56-AB3E-DD799E40E39E}" type="slidenum">
+              <a:rPr lang="en-IN" smtClean="0"/>
+              <a:t>‹#›</a:t>
+            </a:fld>
+            <a:endParaRPr lang="en-IN"/>
+          </a:p>
+        </p:txBody>
+      </p:sp>
+    </p:spTree>
+    <p:extLst>
+      <p:ext uri="{BB962C8B-B14F-4D97-AF65-F5344CB8AC3E}">
+        <p14:creationId xmlns:p14="http://schemas.microsoft.com/office/powerpoint/2010/main" val="1171767100"/>
+      </p:ext>
+    </p:extLst>
+  </p:cSld>
+  <p:clrMap bg1="lt1" tx1="dk1" bg2="lt2" tx2="dk2" accent1="accent1" accent2="accent2" accent3="accent3" accent4="accent4" accent5="accent5" accent6="accent6" hlink="hlink" folHlink="folHlink"/>
+  <p:notesStyle>
+    <a:lvl1pPr marL="0" algn="l" defTabSz="914400" rtl="0" eaLnBrk="1" latinLnBrk="0" hangingPunct="1">
+      <a:defRPr sz="1200" kern="1200">
+        <a:solidFill>
+          <a:schemeClr val="tx1"/>
+        </a:solidFill>
+        <a:latin typeface="+mn-lt"/>
+        <a:ea typeface="+mn-ea"/>
+        <a:cs typeface="+mn-cs"/>
+      </a:defRPr>
+    </a:lvl1pPr>
+    <a:lvl2pPr marL="457200" algn="l" defTabSz="914400" rtl="0" eaLnBrk="1" latinLnBrk="0" hangingPunct="1">
+      <a:defRPr sz="1200" kern="1200">
+        <a:solidFill>
+          <a:schemeClr val="tx1"/>
+        </a:solidFill>
+        <a:latin typeface="+mn-lt"/>
+        <a:ea typeface="+mn-ea"/>
+        <a:cs typeface="+mn-cs"/>
+      </a:defRPr>
+    </a:lvl2pPr>
+    <a:lvl3pPr marL="914400" algn="l" defTabSz="914400" rtl="0" eaLnBrk="1" latinLnBrk="0" hangingPunct="1">
+      <a:defRPr sz="1200" kern="1200">
+        <a:solidFill>
+          <a:schemeClr val="tx1"/>
+        </a:solidFill>
+        <a:latin typeface="+mn-lt"/>
+        <a:ea typeface="+mn-ea"/>
+        <a:cs typeface="+mn-cs"/>
+      </a:defRPr>
+    </a:lvl3pPr>
+    <a:lvl4pPr marL="1371600" algn="l" defTabSz="914400" rtl="0" eaLnBrk="1" latinLnBrk="0" hangingPunct="1">
+      <a:defRPr sz="1200" kern="1200">
+        <a:solidFill>
+          <a:schemeClr val="tx1"/>
+        </a:solidFill>
+        <a:latin typeface="+mn-lt"/>
+        <a:ea typeface="+mn-ea"/>
+        <a:cs typeface="+mn-cs"/>
+      </a:defRPr>
+    </a:lvl4pPr>
+    <a:lvl5pPr marL="1828800" algn="l" defTabSz="914400" rtl="0" eaLnBrk="1" latinLnBrk="0" hangingPunct="1">
+      <a:defRPr sz="1200" kern="1200">
+        <a:solidFill>
+          <a:schemeClr val="tx1"/>
+        </a:solidFill>
+        <a:latin typeface="+mn-lt"/>
+        <a:ea typeface="+mn-ea"/>
+        <a:cs typeface="+mn-cs"/>
+      </a:defRPr>
+    </a:lvl5pPr>
+    <a:lvl6pPr marL="2286000" algn="l" defTabSz="914400" rtl="0" eaLnBrk="1" latinLnBrk="0" hangingPunct="1">
+      <a:defRPr sz="1200" kern="1200">
+        <a:solidFill>
+          <a:schemeClr val="tx1"/>
+        </a:solidFill>
+        <a:latin typeface="+mn-lt"/>
+        <a:ea typeface="+mn-ea"/>
+        <a:cs typeface="+mn-cs"/>
+      </a:defRPr>
+    </a:lvl6pPr>
+    <a:lvl7pPr marL="2743200" algn="l" defTabSz="914400" rtl="0" eaLnBrk="1" latinLnBrk="0" hangingPunct="1">
+      <a:defRPr sz="1200" kern="1200">
+        <a:solidFill>
+          <a:schemeClr val="tx1"/>
+        </a:solidFill>
+        <a:latin typeface="+mn-lt"/>
+        <a:ea typeface="+mn-ea"/>
+        <a:cs typeface="+mn-cs"/>
+      </a:defRPr>
+    </a:lvl7pPr>
+    <a:lvl8pPr marL="3200400" algn="l" defTabSz="914400" rtl="0" eaLnBrk="1" latinLnBrk="0" hangingPunct="1">
+      <a:defRPr sz="1200" kern="1200">
+        <a:solidFill>
+          <a:schemeClr val="tx1"/>
+        </a:solidFill>
+        <a:latin typeface="+mn-lt"/>
+        <a:ea typeface="+mn-ea"/>
+        <a:cs typeface="+mn-cs"/>
+      </a:defRPr>
+    </a:lvl8pPr>
+    <a:lvl9pPr marL="3657600" algn="l" defTabSz="914400" rtl="0" eaLnBrk="1" latinLnBrk="0" hangingPunct="1">
+      <a:defRPr sz="1200" kern="1200">
+        <a:solidFill>
+          <a:schemeClr val="tx1"/>
+        </a:solidFill>
+        <a:latin typeface="+mn-lt"/>
+        <a:ea typeface="+mn-ea"/>
+        <a:cs typeface="+mn-cs"/>
+      </a:defRPr>
+    </a:lvl9pPr>
+  </p:notesStyle>
+</p:notesMaster>
+</file>
+
+<file path=ppt/notesSlides/notesSlide1.xml><?xml version="1.0" encoding="utf-8"?>
+<p:notes xmlns:a="http://schemas.openxmlformats.org/drawingml/2006/main" xmlns:r="http://schemas.openxmlformats.org/officeDocument/2006/relationships" xmlns:p="http://schemas.openxmlformats.org/presentationml/2006/main">
+  <p:cSld>
+    <p:spTree>
+      <p:nvGrpSpPr>
+        <p:cNvPr id="1" name=""/>
+        <p:cNvGrpSpPr/>
+        <p:nvPr/>
+      </p:nvGrpSpPr>
+      <p:grpSpPr>
+        <a:xfrm>
+          <a:off x="0" y="0"/>
+          <a:ext cx="0" cy="0"/>
+          <a:chOff x="0" y="0"/>
+          <a:chExt cx="0" cy="0"/>
+        </a:xfrm>
+      </p:grpSpPr>
+      <p:sp>
+        <p:nvSpPr>
+          <p:cNvPr id="2" name="Slide Image Placeholder 1"/>
+          <p:cNvSpPr>
+            <a:spLocks noGrp="1" noRot="1" noChangeAspect="1"/>
+          </p:cNvSpPr>
+          <p:nvPr>
+            <p:ph type="sldImg"/>
+          </p:nvPr>
+        </p:nvSpPr>
+        <p:spPr/>
+      </p:sp>
+      <p:sp>
+        <p:nvSpPr>
+          <p:cNvPr id="3" name="Notes Placeholder 2"/>
+          <p:cNvSpPr>
+            <a:spLocks noGrp="1"/>
+          </p:cNvSpPr>
+          <p:nvPr>
+            <p:ph type="body" idx="1"/>
+          </p:nvPr>
+        </p:nvSpPr>
+        <p:spPr/>
+        <p:txBody>
+          <a:bodyPr/>
+          <a:lstStyle/>
+          <a:p>
+            <a:r>
+              <a:rPr lang="en-IN" dirty="0" smtClean="0"/>
+              <a:t>Ingress Controller</a:t>
+            </a:r>
+            <a:r>
+              <a:rPr lang="en-IN" baseline="0" dirty="0" smtClean="0"/>
+              <a:t> created in namespace – “ingress-</a:t>
+            </a:r>
+            <a:r>
+              <a:rPr lang="en-IN" baseline="0" dirty="0" err="1" smtClean="0"/>
+              <a:t>nginx</a:t>
+            </a:r>
+            <a:r>
+              <a:rPr lang="en-IN" baseline="0" dirty="0" smtClean="0"/>
+              <a:t>”. Application runs in namespace “default”</a:t>
+            </a:r>
+            <a:endParaRPr lang="en-IN" dirty="0"/>
+          </a:p>
+        </p:txBody>
+      </p:sp>
+      <p:sp>
+        <p:nvSpPr>
+          <p:cNvPr id="4" name="Slide Number Placeholder 3"/>
+          <p:cNvSpPr>
+            <a:spLocks noGrp="1"/>
+          </p:cNvSpPr>
+          <p:nvPr>
+            <p:ph type="sldNum" sz="quarter" idx="10"/>
+          </p:nvPr>
+        </p:nvSpPr>
+        <p:spPr/>
+        <p:txBody>
+          <a:bodyPr/>
+          <a:lstStyle/>
+          <a:p>
+            <a:fld id="{6F4109A8-805D-4E56-AB3E-DD799E40E39E}" type="slidenum">
+              <a:rPr lang="en-IN" smtClean="0"/>
+              <a:t>14</a:t>
+            </a:fld>
+            <a:endParaRPr lang="en-IN"/>
+          </a:p>
+        </p:txBody>
+      </p:sp>
+    </p:spTree>
+    <p:extLst>
+      <p:ext uri="{BB962C8B-B14F-4D97-AF65-F5344CB8AC3E}">
+        <p14:creationId xmlns:p14="http://schemas.microsoft.com/office/powerpoint/2010/main" val="764873216"/>
+      </p:ext>
+    </p:extLst>
+  </p:cSld>
+  <p:clrMapOvr>
+    <a:masterClrMapping/>
+  </p:clrMapOvr>
+</p:notes>
+</file>
+
 <file path=ppt/slideLayouts/slideLayout1.xml><?xml version="1.0" encoding="utf-8"?>
 <p:sldLayout xmlns:a="http://schemas.openxmlformats.org/drawingml/2006/main" xmlns:r="http://schemas.openxmlformats.org/officeDocument/2006/relationships" xmlns:p="http://schemas.openxmlformats.org/presentationml/2006/main" type="title" preserve="1">
   <p:cSld name="Title Slide">
@@ -291,7 +755,7 @@
             <a:fld id="{1D8BD707-D9CF-40AE-B4C6-C98DA3205C09}" type="datetimeFigureOut">
               <a:rPr lang="en-US" smtClean="0"/>
               <a:pPr/>
-              <a:t>4/15/2023</a:t>
+              <a:t>5/2/2023</a:t>
             </a:fld>
             <a:endParaRPr lang="en-US"/>
           </a:p>
@@ -458,7 +922,7 @@
             <a:fld id="{1D8BD707-D9CF-40AE-B4C6-C98DA3205C09}" type="datetimeFigureOut">
               <a:rPr lang="en-US" smtClean="0"/>
               <a:pPr/>
-              <a:t>4/15/2023</a:t>
+              <a:t>5/2/2023</a:t>
             </a:fld>
             <a:endParaRPr lang="en-US"/>
           </a:p>
@@ -635,7 +1099,7 @@
             <a:fld id="{1D8BD707-D9CF-40AE-B4C6-C98DA3205C09}" type="datetimeFigureOut">
               <a:rPr lang="en-US" smtClean="0"/>
               <a:pPr/>
-              <a:t>4/15/2023</a:t>
+              <a:t>5/2/2023</a:t>
             </a:fld>
             <a:endParaRPr lang="en-US"/>
           </a:p>
@@ -802,7 +1266,7 @@
             <a:fld id="{1D8BD707-D9CF-40AE-B4C6-C98DA3205C09}" type="datetimeFigureOut">
               <a:rPr lang="en-US" smtClean="0"/>
               <a:pPr/>
-              <a:t>4/15/2023</a:t>
+              <a:t>5/2/2023</a:t>
             </a:fld>
             <a:endParaRPr lang="en-US"/>
           </a:p>
@@ -1045,7 +1509,7 @@
             <a:fld id="{1D8BD707-D9CF-40AE-B4C6-C98DA3205C09}" type="datetimeFigureOut">
               <a:rPr lang="en-US" smtClean="0"/>
               <a:pPr/>
-              <a:t>4/15/2023</a:t>
+              <a:t>5/2/2023</a:t>
             </a:fld>
             <a:endParaRPr lang="en-US"/>
           </a:p>
@@ -1330,7 +1794,7 @@
             <a:fld id="{1D8BD707-D9CF-40AE-B4C6-C98DA3205C09}" type="datetimeFigureOut">
               <a:rPr lang="en-US" smtClean="0"/>
               <a:pPr/>
-              <a:t>4/15/2023</a:t>
+              <a:t>5/2/2023</a:t>
             </a:fld>
             <a:endParaRPr lang="en-US"/>
           </a:p>
@@ -1749,7 +2213,7 @@
             <a:fld id="{1D8BD707-D9CF-40AE-B4C6-C98DA3205C09}" type="datetimeFigureOut">
               <a:rPr lang="en-US" smtClean="0"/>
               <a:pPr/>
-              <a:t>4/15/2023</a:t>
+              <a:t>5/2/2023</a:t>
             </a:fld>
             <a:endParaRPr lang="en-US"/>
           </a:p>
@@ -1864,7 +2328,7 @@
             <a:fld id="{1D8BD707-D9CF-40AE-B4C6-C98DA3205C09}" type="datetimeFigureOut">
               <a:rPr lang="en-US" smtClean="0"/>
               <a:pPr/>
-              <a:t>4/15/2023</a:t>
+              <a:t>5/2/2023</a:t>
             </a:fld>
             <a:endParaRPr lang="en-US"/>
           </a:p>
@@ -1956,7 +2420,7 @@
             <a:fld id="{1D8BD707-D9CF-40AE-B4C6-C98DA3205C09}" type="datetimeFigureOut">
               <a:rPr lang="en-US" smtClean="0"/>
               <a:pPr/>
-              <a:t>4/15/2023</a:t>
+              <a:t>5/2/2023</a:t>
             </a:fld>
             <a:endParaRPr lang="en-US"/>
           </a:p>
@@ -2230,7 +2694,7 @@
             <a:fld id="{1D8BD707-D9CF-40AE-B4C6-C98DA3205C09}" type="datetimeFigureOut">
               <a:rPr lang="en-US" smtClean="0"/>
               <a:pPr/>
-              <a:t>4/15/2023</a:t>
+              <a:t>5/2/2023</a:t>
             </a:fld>
             <a:endParaRPr lang="en-US"/>
           </a:p>
@@ -2480,7 +2944,7 @@
             <a:fld id="{1D8BD707-D9CF-40AE-B4C6-C98DA3205C09}" type="datetimeFigureOut">
               <a:rPr lang="en-US" smtClean="0"/>
               <a:pPr/>
-              <a:t>4/15/2023</a:t>
+              <a:t>5/2/2023</a:t>
             </a:fld>
             <a:endParaRPr lang="en-US"/>
           </a:p>
@@ -2690,7 +3154,7 @@
             <a:fld id="{1D8BD707-D9CF-40AE-B4C6-C98DA3205C09}" type="datetimeFigureOut">
               <a:rPr lang="en-US" smtClean="0"/>
               <a:pPr/>
-              <a:t>4/15/2023</a:t>
+              <a:t>5/2/2023</a:t>
             </a:fld>
             <a:endParaRPr lang="en-US"/>
           </a:p>
@@ -3116,6 +3580,1344 @@
 </p:sld>
 </file>
 
+<file path=ppt/slides/slide10.xml><?xml version="1.0" encoding="utf-8"?>
+<p:sld xmlns:a="http://schemas.openxmlformats.org/drawingml/2006/main" xmlns:r="http://schemas.openxmlformats.org/officeDocument/2006/relationships" xmlns:p="http://schemas.openxmlformats.org/presentationml/2006/main">
+  <p:cSld>
+    <p:spTree>
+      <p:nvGrpSpPr>
+        <p:cNvPr id="1" name=""/>
+        <p:cNvGrpSpPr/>
+        <p:nvPr/>
+      </p:nvGrpSpPr>
+      <p:grpSpPr>
+        <a:xfrm>
+          <a:off x="0" y="0"/>
+          <a:ext cx="0" cy="0"/>
+          <a:chOff x="0" y="0"/>
+          <a:chExt cx="0" cy="0"/>
+        </a:xfrm>
+      </p:grpSpPr>
+      <p:sp>
+        <p:nvSpPr>
+          <p:cNvPr id="3" name="Content Placeholder 2"/>
+          <p:cNvSpPr>
+            <a:spLocks noGrp="1"/>
+          </p:cNvSpPr>
+          <p:nvPr>
+            <p:ph idx="1"/>
+          </p:nvPr>
+        </p:nvSpPr>
+        <p:spPr>
+          <a:xfrm>
+            <a:off x="457200" y="533400"/>
+            <a:ext cx="8229600" cy="5592763"/>
+          </a:xfrm>
+        </p:spPr>
+        <p:txBody>
+          <a:bodyPr/>
+          <a:lstStyle/>
+          <a:p>
+            <a:pPr marL="0" indent="0">
+              <a:buNone/>
+            </a:pPr>
+            <a:r>
+              <a:rPr lang="en-IN" dirty="0" err="1" smtClean="0"/>
+              <a:t>ClusterIP</a:t>
+            </a:r>
+            <a:r>
+              <a:rPr lang="en-IN" dirty="0" smtClean="0"/>
+              <a:t> creation :</a:t>
+            </a:r>
+          </a:p>
+          <a:p>
+            <a:pPr marL="0" indent="0">
+              <a:buNone/>
+            </a:pPr>
+            <a:r>
+              <a:rPr lang="en-IN" dirty="0" smtClean="0"/>
+              <a:t>Platform Service			Command Service</a:t>
+            </a:r>
+            <a:endParaRPr lang="en-IN" dirty="0"/>
+          </a:p>
+        </p:txBody>
+      </p:sp>
+      <p:pic>
+        <p:nvPicPr>
+          <p:cNvPr id="5122" name="Picture 2"/>
+          <p:cNvPicPr>
+            <a:picLocks noChangeAspect="1" noChangeArrowheads="1"/>
+          </p:cNvPicPr>
+          <p:nvPr/>
+        </p:nvPicPr>
+        <p:blipFill>
+          <a:blip r:embed="rId2" cstate="print">
+            <a:extLst>
+              <a:ext uri="{28A0092B-C50C-407E-A947-70E740481C1C}">
+                <a14:useLocalDpi xmlns:a14="http://schemas.microsoft.com/office/drawing/2010/main" val="0"/>
+              </a:ext>
+            </a:extLst>
+          </a:blip>
+          <a:srcRect/>
+          <a:stretch>
+            <a:fillRect/>
+          </a:stretch>
+        </p:blipFill>
+        <p:spPr bwMode="auto">
+          <a:xfrm>
+            <a:off x="5257800" y="1905000"/>
+            <a:ext cx="3657600" cy="4541837"/>
+          </a:xfrm>
+          <a:prstGeom prst="rect">
+            <a:avLst/>
+          </a:prstGeom>
+          <a:noFill/>
+          <a:ln>
+            <a:noFill/>
+          </a:ln>
+          <a:effectLst/>
+          <a:extLst>
+            <a:ext uri="{909E8E84-426E-40DD-AFC4-6F175D3DCCD1}">
+              <a14:hiddenFill xmlns:a14="http://schemas.microsoft.com/office/drawing/2010/main">
+                <a:solidFill>
+                  <a:schemeClr val="accent1"/>
+                </a:solidFill>
+              </a14:hiddenFill>
+            </a:ext>
+            <a:ext uri="{91240B29-F687-4F45-9708-019B960494DF}">
+              <a14:hiddenLine xmlns:a14="http://schemas.microsoft.com/office/drawing/2010/main" w="9525">
+                <a:solidFill>
+                  <a:schemeClr val="tx1"/>
+                </a:solidFill>
+                <a:miter lim="800000"/>
+                <a:headEnd/>
+                <a:tailEnd/>
+              </a14:hiddenLine>
+            </a:ext>
+            <a:ext uri="{AF507438-7753-43E0-B8FC-AC1667EBCBE1}">
+              <a14:hiddenEffects xmlns:a14="http://schemas.microsoft.com/office/drawing/2010/main">
+                <a:effectLst>
+                  <a:outerShdw dist="35921" dir="2700000" algn="ctr" rotWithShape="0">
+                    <a:schemeClr val="bg2"/>
+                  </a:outerShdw>
+                </a:effectLst>
+              </a14:hiddenEffects>
+            </a:ext>
+          </a:extLst>
+        </p:spPr>
+      </p:pic>
+      <p:pic>
+        <p:nvPicPr>
+          <p:cNvPr id="5123" name="Picture 3"/>
+          <p:cNvPicPr>
+            <a:picLocks noChangeAspect="1" noChangeArrowheads="1"/>
+          </p:cNvPicPr>
+          <p:nvPr/>
+        </p:nvPicPr>
+        <p:blipFill>
+          <a:blip r:embed="rId3" cstate="print">
+            <a:extLst>
+              <a:ext uri="{28A0092B-C50C-407E-A947-70E740481C1C}">
+                <a14:useLocalDpi xmlns:a14="http://schemas.microsoft.com/office/drawing/2010/main" val="0"/>
+              </a:ext>
+            </a:extLst>
+          </a:blip>
+          <a:srcRect/>
+          <a:stretch>
+            <a:fillRect/>
+          </a:stretch>
+        </p:blipFill>
+        <p:spPr bwMode="auto">
+          <a:xfrm>
+            <a:off x="533400" y="1676400"/>
+            <a:ext cx="4267200" cy="4953000"/>
+          </a:xfrm>
+          <a:prstGeom prst="rect">
+            <a:avLst/>
+          </a:prstGeom>
+          <a:noFill/>
+          <a:ln>
+            <a:noFill/>
+          </a:ln>
+          <a:effectLst/>
+          <a:extLst>
+            <a:ext uri="{909E8E84-426E-40DD-AFC4-6F175D3DCCD1}">
+              <a14:hiddenFill xmlns:a14="http://schemas.microsoft.com/office/drawing/2010/main">
+                <a:solidFill>
+                  <a:schemeClr val="accent1"/>
+                </a:solidFill>
+              </a14:hiddenFill>
+            </a:ext>
+            <a:ext uri="{91240B29-F687-4F45-9708-019B960494DF}">
+              <a14:hiddenLine xmlns:a14="http://schemas.microsoft.com/office/drawing/2010/main" w="9525">
+                <a:solidFill>
+                  <a:schemeClr val="tx1"/>
+                </a:solidFill>
+                <a:miter lim="800000"/>
+                <a:headEnd/>
+                <a:tailEnd/>
+              </a14:hiddenLine>
+            </a:ext>
+            <a:ext uri="{AF507438-7753-43E0-B8FC-AC1667EBCBE1}">
+              <a14:hiddenEffects xmlns:a14="http://schemas.microsoft.com/office/drawing/2010/main">
+                <a:effectLst>
+                  <a:outerShdw dist="35921" dir="2700000" algn="ctr" rotWithShape="0">
+                    <a:schemeClr val="bg2"/>
+                  </a:outerShdw>
+                </a:effectLst>
+              </a14:hiddenEffects>
+            </a:ext>
+          </a:extLst>
+        </p:spPr>
+      </p:pic>
+    </p:spTree>
+    <p:extLst>
+      <p:ext uri="{BB962C8B-B14F-4D97-AF65-F5344CB8AC3E}">
+        <p14:creationId xmlns:p14="http://schemas.microsoft.com/office/powerpoint/2010/main" val="1376270720"/>
+      </p:ext>
+    </p:extLst>
+  </p:cSld>
+  <p:clrMapOvr>
+    <a:masterClrMapping/>
+  </p:clrMapOvr>
+</p:sld>
+</file>
+
+<file path=ppt/slides/slide11.xml><?xml version="1.0" encoding="utf-8"?>
+<p:sld xmlns:a="http://schemas.openxmlformats.org/drawingml/2006/main" xmlns:r="http://schemas.openxmlformats.org/officeDocument/2006/relationships" xmlns:p="http://schemas.openxmlformats.org/presentationml/2006/main">
+  <p:cSld>
+    <p:spTree>
+      <p:nvGrpSpPr>
+        <p:cNvPr id="1" name=""/>
+        <p:cNvGrpSpPr/>
+        <p:nvPr/>
+      </p:nvGrpSpPr>
+      <p:grpSpPr>
+        <a:xfrm>
+          <a:off x="0" y="0"/>
+          <a:ext cx="0" cy="0"/>
+          <a:chOff x="0" y="0"/>
+          <a:chExt cx="0" cy="0"/>
+        </a:xfrm>
+      </p:grpSpPr>
+      <p:sp>
+        <p:nvSpPr>
+          <p:cNvPr id="4" name="Content Placeholder 3"/>
+          <p:cNvSpPr>
+            <a:spLocks noGrp="1"/>
+          </p:cNvSpPr>
+          <p:nvPr>
+            <p:ph idx="1"/>
+          </p:nvPr>
+        </p:nvSpPr>
+        <p:spPr>
+          <a:xfrm>
+            <a:off x="457200" y="533400"/>
+            <a:ext cx="8229600" cy="5592763"/>
+          </a:xfrm>
+        </p:spPr>
+        <p:txBody>
+          <a:bodyPr>
+            <a:normAutofit fontScale="92500" lnSpcReduction="20000"/>
+          </a:bodyPr>
+          <a:lstStyle/>
+          <a:p>
+            <a:pPr marL="0" indent="0">
+              <a:buNone/>
+            </a:pPr>
+            <a:r>
+              <a:rPr lang="en-IN" sz="2000" dirty="0" smtClean="0"/>
+              <a:t>Configure Cluster IP in Platform Service for making HTTP Request:</a:t>
+            </a:r>
+          </a:p>
+          <a:p>
+            <a:pPr marL="0" indent="0">
+              <a:buNone/>
+            </a:pPr>
+            <a:endParaRPr lang="en-IN" sz="2000" dirty="0" smtClean="0"/>
+          </a:p>
+          <a:p>
+            <a:pPr marL="400050" lvl="1" indent="0">
+              <a:buNone/>
+            </a:pPr>
+            <a:r>
+              <a:rPr lang="en-IN" sz="1600" dirty="0" smtClean="0"/>
+              <a:t>Add command service </a:t>
+            </a:r>
+            <a:r>
+              <a:rPr lang="en-IN" sz="1600" dirty="0" err="1" smtClean="0"/>
+              <a:t>clusterIP</a:t>
+            </a:r>
+            <a:r>
+              <a:rPr lang="en-IN" sz="1600" dirty="0" smtClean="0"/>
+              <a:t> </a:t>
+            </a:r>
+            <a:r>
+              <a:rPr lang="en-IN" sz="1600" dirty="0" err="1" smtClean="0"/>
+              <a:t>uri</a:t>
+            </a:r>
+            <a:r>
+              <a:rPr lang="en-IN" sz="1600" dirty="0" smtClean="0"/>
+              <a:t> in platform service </a:t>
+            </a:r>
+            <a:r>
+              <a:rPr lang="en-IN" sz="1600" dirty="0" err="1" smtClean="0"/>
+              <a:t>config</a:t>
+            </a:r>
+            <a:r>
+              <a:rPr lang="en-IN" sz="1600" dirty="0" smtClean="0"/>
+              <a:t> file.</a:t>
+            </a:r>
+          </a:p>
+          <a:p>
+            <a:pPr marL="400050" lvl="1" indent="0">
+              <a:buNone/>
+            </a:pPr>
+            <a:endParaRPr lang="en-IN" sz="1600" dirty="0"/>
+          </a:p>
+          <a:p>
+            <a:pPr marL="400050" lvl="1" indent="0">
+              <a:buNone/>
+            </a:pPr>
+            <a:endParaRPr lang="en-IN" sz="1600" dirty="0" smtClean="0"/>
+          </a:p>
+          <a:p>
+            <a:pPr marL="400050" lvl="1" indent="0">
+              <a:buNone/>
+            </a:pPr>
+            <a:endParaRPr lang="en-IN" sz="1600" dirty="0"/>
+          </a:p>
+          <a:p>
+            <a:pPr marL="400050" lvl="1" indent="0">
+              <a:buNone/>
+            </a:pPr>
+            <a:endParaRPr lang="en-IN" sz="1600" dirty="0" smtClean="0"/>
+          </a:p>
+          <a:p>
+            <a:pPr marL="400050" lvl="1" indent="0">
+              <a:buNone/>
+            </a:pPr>
+            <a:endParaRPr lang="en-IN" sz="1600" dirty="0" smtClean="0"/>
+          </a:p>
+          <a:p>
+            <a:pPr marL="400050" lvl="1" indent="0">
+              <a:buNone/>
+            </a:pPr>
+            <a:endParaRPr lang="en-IN" sz="1600" dirty="0"/>
+          </a:p>
+          <a:p>
+            <a:pPr marL="0" indent="0">
+              <a:buNone/>
+            </a:pPr>
+            <a:endParaRPr lang="en-IN" sz="2000" dirty="0" smtClean="0"/>
+          </a:p>
+          <a:p>
+            <a:pPr marL="0" indent="0">
+              <a:buNone/>
+            </a:pPr>
+            <a:endParaRPr lang="en-IN" sz="2000" dirty="0"/>
+          </a:p>
+          <a:p>
+            <a:pPr marL="400050" lvl="1" indent="0">
+              <a:buNone/>
+            </a:pPr>
+            <a:r>
+              <a:rPr lang="en-IN" sz="1600" dirty="0" smtClean="0"/>
+              <a:t>Use above </a:t>
+            </a:r>
+            <a:r>
+              <a:rPr lang="en-IN" sz="1600" dirty="0" err="1" smtClean="0"/>
+              <a:t>config</a:t>
+            </a:r>
+            <a:r>
+              <a:rPr lang="en-IN" sz="1600" dirty="0" smtClean="0"/>
+              <a:t> in making http request to command </a:t>
+            </a:r>
+            <a:r>
+              <a:rPr lang="en-IN" sz="1600" dirty="0" err="1" smtClean="0"/>
+              <a:t>servuce</a:t>
+            </a:r>
+            <a:r>
+              <a:rPr lang="en-IN" sz="1600" dirty="0" smtClean="0"/>
+              <a:t>. Options pattern is used to get the URI from configuration file.</a:t>
+            </a:r>
+          </a:p>
+          <a:p>
+            <a:pPr marL="400050" lvl="1" indent="0">
+              <a:buNone/>
+            </a:pPr>
+            <a:endParaRPr lang="en-IN" sz="1600" dirty="0" smtClean="0"/>
+          </a:p>
+          <a:p>
+            <a:pPr marL="0" indent="0">
+              <a:buNone/>
+            </a:pPr>
+            <a:endParaRPr lang="en-IN" sz="2000" dirty="0" smtClean="0"/>
+          </a:p>
+          <a:p>
+            <a:pPr marL="0" indent="0">
+              <a:buNone/>
+            </a:pPr>
+            <a:endParaRPr lang="en-IN" sz="2000" dirty="0"/>
+          </a:p>
+          <a:p>
+            <a:pPr marL="0" indent="0">
+              <a:buNone/>
+            </a:pPr>
+            <a:endParaRPr lang="en-IN" sz="2000" dirty="0" smtClean="0"/>
+          </a:p>
+          <a:p>
+            <a:pPr marL="0" indent="0">
+              <a:buNone/>
+            </a:pPr>
+            <a:r>
+              <a:rPr lang="en-IN" sz="2000" dirty="0" smtClean="0"/>
+              <a:t> 																																								</a:t>
+            </a:r>
+          </a:p>
+          <a:p>
+            <a:pPr marL="0" indent="0">
+              <a:buNone/>
+            </a:pPr>
+            <a:endParaRPr lang="en-IN" sz="2000" dirty="0"/>
+          </a:p>
+        </p:txBody>
+      </p:sp>
+      <p:pic>
+        <p:nvPicPr>
+          <p:cNvPr id="4099" name="Picture 3"/>
+          <p:cNvPicPr>
+            <a:picLocks noChangeAspect="1" noChangeArrowheads="1"/>
+          </p:cNvPicPr>
+          <p:nvPr/>
+        </p:nvPicPr>
+        <p:blipFill>
+          <a:blip r:embed="rId2" cstate="print">
+            <a:extLst>
+              <a:ext uri="{28A0092B-C50C-407E-A947-70E740481C1C}">
+                <a14:useLocalDpi xmlns:a14="http://schemas.microsoft.com/office/drawing/2010/main" val="0"/>
+              </a:ext>
+            </a:extLst>
+          </a:blip>
+          <a:srcRect/>
+          <a:stretch>
+            <a:fillRect/>
+          </a:stretch>
+        </p:blipFill>
+        <p:spPr bwMode="auto">
+          <a:xfrm>
+            <a:off x="1295400" y="1524000"/>
+            <a:ext cx="4533900" cy="1379537"/>
+          </a:xfrm>
+          <a:prstGeom prst="rect">
+            <a:avLst/>
+          </a:prstGeom>
+          <a:noFill/>
+          <a:ln>
+            <a:noFill/>
+          </a:ln>
+          <a:effectLst/>
+          <a:extLst>
+            <a:ext uri="{909E8E84-426E-40DD-AFC4-6F175D3DCCD1}">
+              <a14:hiddenFill xmlns:a14="http://schemas.microsoft.com/office/drawing/2010/main">
+                <a:solidFill>
+                  <a:schemeClr val="accent1"/>
+                </a:solidFill>
+              </a14:hiddenFill>
+            </a:ext>
+            <a:ext uri="{91240B29-F687-4F45-9708-019B960494DF}">
+              <a14:hiddenLine xmlns:a14="http://schemas.microsoft.com/office/drawing/2010/main" w="9525">
+                <a:solidFill>
+                  <a:schemeClr val="tx1"/>
+                </a:solidFill>
+                <a:miter lim="800000"/>
+                <a:headEnd/>
+                <a:tailEnd/>
+              </a14:hiddenLine>
+            </a:ext>
+            <a:ext uri="{AF507438-7753-43E0-B8FC-AC1667EBCBE1}">
+              <a14:hiddenEffects xmlns:a14="http://schemas.microsoft.com/office/drawing/2010/main">
+                <a:effectLst>
+                  <a:outerShdw dist="35921" dir="2700000" algn="ctr" rotWithShape="0">
+                    <a:schemeClr val="bg2"/>
+                  </a:outerShdw>
+                </a:effectLst>
+              </a14:hiddenEffects>
+            </a:ext>
+          </a:extLst>
+        </p:spPr>
+      </p:pic>
+      <p:pic>
+        <p:nvPicPr>
+          <p:cNvPr id="4100" name="Picture 4"/>
+          <p:cNvPicPr>
+            <a:picLocks noChangeAspect="1" noChangeArrowheads="1"/>
+          </p:cNvPicPr>
+          <p:nvPr/>
+        </p:nvPicPr>
+        <p:blipFill>
+          <a:blip r:embed="rId3" cstate="print">
+            <a:extLst>
+              <a:ext uri="{28A0092B-C50C-407E-A947-70E740481C1C}">
+                <a14:useLocalDpi xmlns:a14="http://schemas.microsoft.com/office/drawing/2010/main" val="0"/>
+              </a:ext>
+            </a:extLst>
+          </a:blip>
+          <a:srcRect/>
+          <a:stretch>
+            <a:fillRect/>
+          </a:stretch>
+        </p:blipFill>
+        <p:spPr bwMode="auto">
+          <a:xfrm>
+            <a:off x="1295400" y="3886200"/>
+            <a:ext cx="7543800" cy="266700"/>
+          </a:xfrm>
+          <a:prstGeom prst="rect">
+            <a:avLst/>
+          </a:prstGeom>
+          <a:noFill/>
+          <a:ln>
+            <a:noFill/>
+          </a:ln>
+          <a:effectLst/>
+          <a:extLst>
+            <a:ext uri="{909E8E84-426E-40DD-AFC4-6F175D3DCCD1}">
+              <a14:hiddenFill xmlns:a14="http://schemas.microsoft.com/office/drawing/2010/main">
+                <a:solidFill>
+                  <a:schemeClr val="accent1"/>
+                </a:solidFill>
+              </a14:hiddenFill>
+            </a:ext>
+            <a:ext uri="{91240B29-F687-4F45-9708-019B960494DF}">
+              <a14:hiddenLine xmlns:a14="http://schemas.microsoft.com/office/drawing/2010/main" w="9525">
+                <a:solidFill>
+                  <a:schemeClr val="tx1"/>
+                </a:solidFill>
+                <a:miter lim="800000"/>
+                <a:headEnd/>
+                <a:tailEnd/>
+              </a14:hiddenLine>
+            </a:ext>
+            <a:ext uri="{AF507438-7753-43E0-B8FC-AC1667EBCBE1}">
+              <a14:hiddenEffects xmlns:a14="http://schemas.microsoft.com/office/drawing/2010/main">
+                <a:effectLst>
+                  <a:outerShdw dist="35921" dir="2700000" algn="ctr" rotWithShape="0">
+                    <a:schemeClr val="bg2"/>
+                  </a:outerShdw>
+                </a:effectLst>
+              </a14:hiddenEffects>
+            </a:ext>
+          </a:extLst>
+        </p:spPr>
+      </p:pic>
+    </p:spTree>
+    <p:extLst>
+      <p:ext uri="{BB962C8B-B14F-4D97-AF65-F5344CB8AC3E}">
+        <p14:creationId xmlns:p14="http://schemas.microsoft.com/office/powerpoint/2010/main" val="4215422855"/>
+      </p:ext>
+    </p:extLst>
+  </p:cSld>
+  <p:clrMapOvr>
+    <a:masterClrMapping/>
+  </p:clrMapOvr>
+</p:sld>
+</file>
+
+<file path=ppt/slides/slide12.xml><?xml version="1.0" encoding="utf-8"?>
+<p:sld xmlns:a="http://schemas.openxmlformats.org/drawingml/2006/main" xmlns:r="http://schemas.openxmlformats.org/officeDocument/2006/relationships" xmlns:p="http://schemas.openxmlformats.org/presentationml/2006/main">
+  <p:cSld>
+    <p:spTree>
+      <p:nvGrpSpPr>
+        <p:cNvPr id="1" name=""/>
+        <p:cNvGrpSpPr/>
+        <p:nvPr/>
+      </p:nvGrpSpPr>
+      <p:grpSpPr>
+        <a:xfrm>
+          <a:off x="0" y="0"/>
+          <a:ext cx="0" cy="0"/>
+          <a:chOff x="0" y="0"/>
+          <a:chExt cx="0" cy="0"/>
+        </a:xfrm>
+      </p:grpSpPr>
+      <p:sp>
+        <p:nvSpPr>
+          <p:cNvPr id="6" name="Title 1"/>
+          <p:cNvSpPr>
+            <a:spLocks noGrp="1"/>
+          </p:cNvSpPr>
+          <p:nvPr>
+            <p:ph type="title"/>
+          </p:nvPr>
+        </p:nvSpPr>
+        <p:spPr>
+          <a:xfrm>
+            <a:off x="457200" y="274638"/>
+            <a:ext cx="8229600" cy="1143000"/>
+          </a:xfrm>
+        </p:spPr>
+        <p:txBody>
+          <a:bodyPr>
+            <a:normAutofit fontScale="90000"/>
+          </a:bodyPr>
+          <a:lstStyle/>
+          <a:p>
+            <a:r>
+              <a:rPr lang="en-IN" sz="4000" dirty="0" smtClean="0">
+                <a:solidFill>
+                  <a:schemeClr val="bg2">
+                    <a:lumMod val="25000"/>
+                  </a:schemeClr>
+                </a:solidFill>
+              </a:rPr>
+              <a:t>STAGE 4: Install </a:t>
+            </a:r>
+            <a:r>
+              <a:rPr lang="en-IN" sz="4000" dirty="0" err="1" smtClean="0">
+                <a:solidFill>
+                  <a:schemeClr val="bg2">
+                    <a:lumMod val="25000"/>
+                  </a:schemeClr>
+                </a:solidFill>
+              </a:rPr>
+              <a:t>nginx</a:t>
+            </a:r>
+            <a:r>
+              <a:rPr lang="en-IN" sz="4000" dirty="0" smtClean="0">
+                <a:solidFill>
+                  <a:schemeClr val="bg2">
+                    <a:lumMod val="25000"/>
+                  </a:schemeClr>
+                </a:solidFill>
+              </a:rPr>
+              <a:t> Ingress controller in </a:t>
+            </a:r>
+            <a:r>
+              <a:rPr lang="en-IN" sz="4000" dirty="0" err="1" smtClean="0">
+                <a:solidFill>
+                  <a:schemeClr val="bg2">
+                    <a:lumMod val="25000"/>
+                  </a:schemeClr>
+                </a:solidFill>
+              </a:rPr>
+              <a:t>kubernetes</a:t>
+            </a:r>
+            <a:r>
+              <a:rPr lang="en-IN" sz="4000" dirty="0" smtClean="0">
+                <a:solidFill>
+                  <a:schemeClr val="bg2">
+                    <a:lumMod val="25000"/>
+                  </a:schemeClr>
+                </a:solidFill>
+              </a:rPr>
+              <a:t> cluster</a:t>
+            </a:r>
+            <a:endParaRPr lang="en-IN" sz="4000" dirty="0">
+              <a:solidFill>
+                <a:schemeClr val="bg2">
+                  <a:lumMod val="25000"/>
+                </a:schemeClr>
+              </a:solidFill>
+            </a:endParaRPr>
+          </a:p>
+        </p:txBody>
+      </p:sp>
+      <p:sp>
+        <p:nvSpPr>
+          <p:cNvPr id="2" name="Content Placeholder 1"/>
+          <p:cNvSpPr>
+            <a:spLocks noGrp="1"/>
+          </p:cNvSpPr>
+          <p:nvPr>
+            <p:ph idx="1"/>
+          </p:nvPr>
+        </p:nvSpPr>
+        <p:spPr/>
+        <p:txBody>
+          <a:bodyPr/>
+          <a:lstStyle/>
+          <a:p>
+            <a:r>
+              <a:rPr lang="en-IN" sz="1800" dirty="0" smtClean="0"/>
+              <a:t>What is Ingress Controller – proxy pod to route the request to Pods based on received request. Helps to achieve a single Public IP for all the publicly exposed apps/services running in the cluster. </a:t>
+            </a:r>
+            <a:endParaRPr lang="en-IN" sz="1800" dirty="0"/>
+          </a:p>
+        </p:txBody>
+      </p:sp>
+      <p:pic>
+        <p:nvPicPr>
+          <p:cNvPr id="6147" name="Picture 3"/>
+          <p:cNvPicPr>
+            <a:picLocks noChangeAspect="1" noChangeArrowheads="1"/>
+          </p:cNvPicPr>
+          <p:nvPr/>
+        </p:nvPicPr>
+        <p:blipFill>
+          <a:blip r:embed="rId2" cstate="print">
+            <a:extLst>
+              <a:ext uri="{28A0092B-C50C-407E-A947-70E740481C1C}">
+                <a14:useLocalDpi xmlns:a14="http://schemas.microsoft.com/office/drawing/2010/main" val="0"/>
+              </a:ext>
+            </a:extLst>
+          </a:blip>
+          <a:srcRect/>
+          <a:stretch>
+            <a:fillRect/>
+          </a:stretch>
+        </p:blipFill>
+        <p:spPr bwMode="auto">
+          <a:xfrm>
+            <a:off x="1371600" y="3257462"/>
+            <a:ext cx="5147639" cy="2756818"/>
+          </a:xfrm>
+          <a:prstGeom prst="rect">
+            <a:avLst/>
+          </a:prstGeom>
+          <a:noFill/>
+          <a:ln>
+            <a:noFill/>
+          </a:ln>
+          <a:effectLst/>
+          <a:extLst>
+            <a:ext uri="{909E8E84-426E-40DD-AFC4-6F175D3DCCD1}">
+              <a14:hiddenFill xmlns:a14="http://schemas.microsoft.com/office/drawing/2010/main">
+                <a:solidFill>
+                  <a:schemeClr val="accent1"/>
+                </a:solidFill>
+              </a14:hiddenFill>
+            </a:ext>
+            <a:ext uri="{91240B29-F687-4F45-9708-019B960494DF}">
+              <a14:hiddenLine xmlns:a14="http://schemas.microsoft.com/office/drawing/2010/main" w="9525">
+                <a:solidFill>
+                  <a:schemeClr val="tx1"/>
+                </a:solidFill>
+                <a:miter lim="800000"/>
+                <a:headEnd/>
+                <a:tailEnd/>
+              </a14:hiddenLine>
+            </a:ext>
+            <a:ext uri="{AF507438-7753-43E0-B8FC-AC1667EBCBE1}">
+              <a14:hiddenEffects xmlns:a14="http://schemas.microsoft.com/office/drawing/2010/main">
+                <a:effectLst>
+                  <a:outerShdw dist="35921" dir="2700000" algn="ctr" rotWithShape="0">
+                    <a:schemeClr val="bg2"/>
+                  </a:outerShdw>
+                </a:effectLst>
+              </a14:hiddenEffects>
+            </a:ext>
+          </a:extLst>
+        </p:spPr>
+      </p:pic>
+      <p:sp>
+        <p:nvSpPr>
+          <p:cNvPr id="3" name="Rectangle 2"/>
+          <p:cNvSpPr/>
+          <p:nvPr/>
+        </p:nvSpPr>
+        <p:spPr>
+          <a:xfrm>
+            <a:off x="762000" y="6096000"/>
+            <a:ext cx="6400800" cy="369332"/>
+          </a:xfrm>
+          <a:prstGeom prst="rect">
+            <a:avLst/>
+          </a:prstGeom>
+        </p:spPr>
+        <p:txBody>
+          <a:bodyPr wrap="square">
+            <a:spAutoFit/>
+          </a:bodyPr>
+          <a:lstStyle/>
+          <a:p>
+            <a:r>
+              <a:rPr lang="en-IN" dirty="0"/>
+              <a:t>https://www.youtube.com/watch?v=-wHRGFRnboY</a:t>
+            </a:r>
+          </a:p>
+        </p:txBody>
+      </p:sp>
+    </p:spTree>
+    <p:extLst>
+      <p:ext uri="{BB962C8B-B14F-4D97-AF65-F5344CB8AC3E}">
+        <p14:creationId xmlns:p14="http://schemas.microsoft.com/office/powerpoint/2010/main" val="2915337522"/>
+      </p:ext>
+    </p:extLst>
+  </p:cSld>
+  <p:clrMapOvr>
+    <a:masterClrMapping/>
+  </p:clrMapOvr>
+</p:sld>
+</file>
+
+<file path=ppt/slides/slide13.xml><?xml version="1.0" encoding="utf-8"?>
+<p:sld xmlns:a="http://schemas.openxmlformats.org/drawingml/2006/main" xmlns:r="http://schemas.openxmlformats.org/officeDocument/2006/relationships" xmlns:p="http://schemas.openxmlformats.org/presentationml/2006/main">
+  <p:cSld>
+    <p:spTree>
+      <p:nvGrpSpPr>
+        <p:cNvPr id="1" name=""/>
+        <p:cNvGrpSpPr/>
+        <p:nvPr/>
+      </p:nvGrpSpPr>
+      <p:grpSpPr>
+        <a:xfrm>
+          <a:off x="0" y="0"/>
+          <a:ext cx="0" cy="0"/>
+          <a:chOff x="0" y="0"/>
+          <a:chExt cx="0" cy="0"/>
+        </a:xfrm>
+      </p:grpSpPr>
+      <p:sp>
+        <p:nvSpPr>
+          <p:cNvPr id="3" name="Content Placeholder 2"/>
+          <p:cNvSpPr>
+            <a:spLocks noGrp="1"/>
+          </p:cNvSpPr>
+          <p:nvPr>
+            <p:ph idx="1"/>
+          </p:nvPr>
+        </p:nvSpPr>
+        <p:spPr/>
+        <p:txBody>
+          <a:bodyPr/>
+          <a:lstStyle/>
+          <a:p>
+            <a:pPr marL="0" indent="0">
+              <a:buNone/>
+            </a:pPr>
+            <a:r>
+              <a:rPr lang="en-IN" sz="1800" dirty="0"/>
+              <a:t>	</a:t>
+            </a:r>
+            <a:r>
+              <a:rPr lang="en-IN" sz="1800" dirty="0" err="1" smtClean="0"/>
+              <a:t>Kubernetes</a:t>
+            </a:r>
+            <a:r>
+              <a:rPr lang="en-IN" sz="1800" dirty="0" smtClean="0"/>
+              <a:t> does not comes with ingress controller. But supports ingress controller from third party like </a:t>
+            </a:r>
+            <a:r>
+              <a:rPr lang="en-IN" sz="1800" dirty="0" err="1" smtClean="0"/>
+              <a:t>nginx</a:t>
+            </a:r>
+            <a:r>
+              <a:rPr lang="en-IN" sz="1800" dirty="0" smtClean="0"/>
+              <a:t>, </a:t>
+            </a:r>
+            <a:r>
+              <a:rPr lang="en-IN" sz="1800" dirty="0" err="1" smtClean="0"/>
+              <a:t>istio</a:t>
+            </a:r>
+            <a:r>
+              <a:rPr lang="en-IN" sz="1800" dirty="0" smtClean="0"/>
+              <a:t> and so on.</a:t>
+            </a:r>
+          </a:p>
+          <a:p>
+            <a:pPr marL="0" indent="0">
+              <a:buNone/>
+            </a:pPr>
+            <a:endParaRPr lang="en-IN" sz="1800" dirty="0" smtClean="0"/>
+          </a:p>
+          <a:p>
+            <a:pPr marL="0" indent="0">
+              <a:buNone/>
+            </a:pPr>
+            <a:r>
+              <a:rPr lang="en-IN" sz="1800" dirty="0" smtClean="0"/>
+              <a:t>Ingress Resources: K8s allows user to create/write ingress resources. Ingress resources is a K8s object to write rules for routing to be used by installed ingress controller. </a:t>
+            </a:r>
+          </a:p>
+        </p:txBody>
+      </p:sp>
+      <p:sp>
+        <p:nvSpPr>
+          <p:cNvPr id="4" name="Title 1"/>
+          <p:cNvSpPr>
+            <a:spLocks noGrp="1"/>
+          </p:cNvSpPr>
+          <p:nvPr>
+            <p:ph type="title"/>
+          </p:nvPr>
+        </p:nvSpPr>
+        <p:spPr>
+          <a:xfrm>
+            <a:off x="457200" y="274638"/>
+            <a:ext cx="8229600" cy="1143000"/>
+          </a:xfrm>
+        </p:spPr>
+        <p:txBody>
+          <a:bodyPr>
+            <a:normAutofit fontScale="90000"/>
+          </a:bodyPr>
+          <a:lstStyle/>
+          <a:p>
+            <a:r>
+              <a:rPr lang="en-IN" sz="4000" dirty="0" smtClean="0">
+                <a:solidFill>
+                  <a:schemeClr val="bg2">
+                    <a:lumMod val="25000"/>
+                  </a:schemeClr>
+                </a:solidFill>
+              </a:rPr>
+              <a:t>STAGE 4: Install </a:t>
+            </a:r>
+            <a:r>
+              <a:rPr lang="en-IN" sz="4000" dirty="0" err="1" smtClean="0">
+                <a:solidFill>
+                  <a:schemeClr val="bg2">
+                    <a:lumMod val="25000"/>
+                  </a:schemeClr>
+                </a:solidFill>
+              </a:rPr>
+              <a:t>nginx</a:t>
+            </a:r>
+            <a:r>
+              <a:rPr lang="en-IN" sz="4000" dirty="0" smtClean="0">
+                <a:solidFill>
+                  <a:schemeClr val="bg2">
+                    <a:lumMod val="25000"/>
+                  </a:schemeClr>
+                </a:solidFill>
+              </a:rPr>
+              <a:t> Ingress controller in </a:t>
+            </a:r>
+            <a:r>
+              <a:rPr lang="en-IN" sz="4000" dirty="0" err="1" smtClean="0">
+                <a:solidFill>
+                  <a:schemeClr val="bg2">
+                    <a:lumMod val="25000"/>
+                  </a:schemeClr>
+                </a:solidFill>
+              </a:rPr>
+              <a:t>kubernetes</a:t>
+            </a:r>
+            <a:r>
+              <a:rPr lang="en-IN" sz="4000" dirty="0" smtClean="0">
+                <a:solidFill>
+                  <a:schemeClr val="bg2">
+                    <a:lumMod val="25000"/>
+                  </a:schemeClr>
+                </a:solidFill>
+              </a:rPr>
+              <a:t> cluster</a:t>
+            </a:r>
+            <a:endParaRPr lang="en-IN" sz="4000" dirty="0">
+              <a:solidFill>
+                <a:schemeClr val="bg2">
+                  <a:lumMod val="25000"/>
+                </a:schemeClr>
+              </a:solidFill>
+            </a:endParaRPr>
+          </a:p>
+        </p:txBody>
+      </p:sp>
+    </p:spTree>
+    <p:extLst>
+      <p:ext uri="{BB962C8B-B14F-4D97-AF65-F5344CB8AC3E}">
+        <p14:creationId xmlns:p14="http://schemas.microsoft.com/office/powerpoint/2010/main" val="3729921126"/>
+      </p:ext>
+    </p:extLst>
+  </p:cSld>
+  <p:clrMapOvr>
+    <a:masterClrMapping/>
+  </p:clrMapOvr>
+</p:sld>
+</file>
+
+<file path=ppt/slides/slide14.xml><?xml version="1.0" encoding="utf-8"?>
+<p:sld xmlns:a="http://schemas.openxmlformats.org/drawingml/2006/main" xmlns:r="http://schemas.openxmlformats.org/officeDocument/2006/relationships" xmlns:p="http://schemas.openxmlformats.org/presentationml/2006/main">
+  <p:cSld>
+    <p:spTree>
+      <p:nvGrpSpPr>
+        <p:cNvPr id="1" name=""/>
+        <p:cNvGrpSpPr/>
+        <p:nvPr/>
+      </p:nvGrpSpPr>
+      <p:grpSpPr>
+        <a:xfrm>
+          <a:off x="0" y="0"/>
+          <a:ext cx="0" cy="0"/>
+          <a:chOff x="0" y="0"/>
+          <a:chExt cx="0" cy="0"/>
+        </a:xfrm>
+      </p:grpSpPr>
+      <p:sp>
+        <p:nvSpPr>
+          <p:cNvPr id="3" name="Content Placeholder 2"/>
+          <p:cNvSpPr>
+            <a:spLocks noGrp="1"/>
+          </p:cNvSpPr>
+          <p:nvPr>
+            <p:ph idx="1"/>
+          </p:nvPr>
+        </p:nvSpPr>
+        <p:spPr/>
+        <p:txBody>
+          <a:bodyPr>
+            <a:normAutofit/>
+          </a:bodyPr>
+          <a:lstStyle/>
+          <a:p>
+            <a:pPr marL="0" indent="0">
+              <a:buNone/>
+            </a:pPr>
+            <a:r>
+              <a:rPr lang="en-IN" sz="1400" dirty="0" smtClean="0"/>
+              <a:t>Install Ingress controller for </a:t>
+            </a:r>
+            <a:r>
+              <a:rPr lang="en-IN" sz="1400" dirty="0" err="1" smtClean="0"/>
+              <a:t>kubernetes</a:t>
+            </a:r>
+            <a:r>
+              <a:rPr lang="en-IN" sz="1400" dirty="0" smtClean="0"/>
+              <a:t> in </a:t>
+            </a:r>
+            <a:r>
+              <a:rPr lang="en-IN" sz="1400" dirty="0" err="1" smtClean="0"/>
+              <a:t>Docker</a:t>
+            </a:r>
+            <a:r>
+              <a:rPr lang="en-IN" sz="1400" dirty="0" smtClean="0"/>
+              <a:t> Desktop</a:t>
+            </a:r>
+          </a:p>
+          <a:p>
+            <a:pPr marL="0" indent="0">
+              <a:buNone/>
+            </a:pPr>
+            <a:r>
+              <a:rPr lang="en-GB" sz="1400" dirty="0" err="1"/>
+              <a:t>kubectl</a:t>
+            </a:r>
+            <a:r>
+              <a:rPr lang="en-GB" sz="1400" dirty="0"/>
+              <a:t> apply -f </a:t>
+            </a:r>
+            <a:r>
+              <a:rPr lang="en-GB" sz="1400" dirty="0">
+                <a:hlinkClick r:id="rId3"/>
+              </a:rPr>
+              <a:t>https://</a:t>
+            </a:r>
+            <a:r>
+              <a:rPr lang="en-GB" sz="1400" dirty="0" smtClean="0">
+                <a:hlinkClick r:id="rId3"/>
+              </a:rPr>
+              <a:t>raw.githubusercontent.com/kubernetes/ingress-nginx/controller-v1.7.0/deploy/static/provider/cloud/deploy.yaml</a:t>
+            </a:r>
+            <a:endParaRPr lang="en-GB" sz="1400" dirty="0" smtClean="0"/>
+          </a:p>
+          <a:p>
+            <a:pPr marL="0" indent="0">
+              <a:buNone/>
+            </a:pPr>
+            <a:endParaRPr lang="en-GB" sz="1800" dirty="0"/>
+          </a:p>
+          <a:p>
+            <a:pPr marL="0" indent="0">
+              <a:buNone/>
+            </a:pPr>
+            <a:endParaRPr lang="en-IN" sz="1800" dirty="0" smtClean="0"/>
+          </a:p>
+          <a:p>
+            <a:pPr marL="0" indent="0">
+              <a:buNone/>
+            </a:pPr>
+            <a:endParaRPr lang="en-IN" sz="1800" dirty="0"/>
+          </a:p>
+          <a:p>
+            <a:pPr marL="0" indent="0">
+              <a:buNone/>
+            </a:pPr>
+            <a:endParaRPr lang="en-IN" sz="1800" dirty="0"/>
+          </a:p>
+        </p:txBody>
+      </p:sp>
+      <p:sp>
+        <p:nvSpPr>
+          <p:cNvPr id="4" name="Title 1"/>
+          <p:cNvSpPr>
+            <a:spLocks noGrp="1"/>
+          </p:cNvSpPr>
+          <p:nvPr>
+            <p:ph type="title"/>
+          </p:nvPr>
+        </p:nvSpPr>
+        <p:spPr/>
+        <p:txBody>
+          <a:bodyPr>
+            <a:normAutofit fontScale="90000"/>
+          </a:bodyPr>
+          <a:lstStyle/>
+          <a:p>
+            <a:r>
+              <a:rPr lang="en-IN" sz="4000" dirty="0" smtClean="0">
+                <a:solidFill>
+                  <a:schemeClr val="bg2">
+                    <a:lumMod val="25000"/>
+                  </a:schemeClr>
+                </a:solidFill>
+              </a:rPr>
+              <a:t>STAGE 4: Install </a:t>
+            </a:r>
+            <a:r>
+              <a:rPr lang="en-IN" sz="4000" dirty="0" err="1" smtClean="0">
+                <a:solidFill>
+                  <a:schemeClr val="bg2">
+                    <a:lumMod val="25000"/>
+                  </a:schemeClr>
+                </a:solidFill>
+              </a:rPr>
+              <a:t>nginx</a:t>
+            </a:r>
+            <a:r>
+              <a:rPr lang="en-IN" sz="4000" dirty="0" smtClean="0">
+                <a:solidFill>
+                  <a:schemeClr val="bg2">
+                    <a:lumMod val="25000"/>
+                  </a:schemeClr>
+                </a:solidFill>
+              </a:rPr>
+              <a:t> Ingress controller in </a:t>
+            </a:r>
+            <a:r>
+              <a:rPr lang="en-IN" sz="4000" dirty="0" err="1" smtClean="0">
+                <a:solidFill>
+                  <a:schemeClr val="bg2">
+                    <a:lumMod val="25000"/>
+                  </a:schemeClr>
+                </a:solidFill>
+              </a:rPr>
+              <a:t>kubernetes</a:t>
+            </a:r>
+            <a:r>
+              <a:rPr lang="en-IN" sz="4000" dirty="0" smtClean="0">
+                <a:solidFill>
+                  <a:schemeClr val="bg2">
+                    <a:lumMod val="25000"/>
+                  </a:schemeClr>
+                </a:solidFill>
+              </a:rPr>
+              <a:t> cluster</a:t>
+            </a:r>
+            <a:endParaRPr lang="en-IN" sz="4000" dirty="0">
+              <a:solidFill>
+                <a:schemeClr val="bg2">
+                  <a:lumMod val="25000"/>
+                </a:schemeClr>
+              </a:solidFill>
+            </a:endParaRPr>
+          </a:p>
+        </p:txBody>
+      </p:sp>
+      <p:pic>
+        <p:nvPicPr>
+          <p:cNvPr id="7170" name="Picture 2"/>
+          <p:cNvPicPr>
+            <a:picLocks noChangeAspect="1" noChangeArrowheads="1"/>
+          </p:cNvPicPr>
+          <p:nvPr/>
+        </p:nvPicPr>
+        <p:blipFill>
+          <a:blip r:embed="rId4" cstate="print">
+            <a:extLst>
+              <a:ext uri="{28A0092B-C50C-407E-A947-70E740481C1C}">
+                <a14:useLocalDpi xmlns:a14="http://schemas.microsoft.com/office/drawing/2010/main" val="0"/>
+              </a:ext>
+            </a:extLst>
+          </a:blip>
+          <a:srcRect/>
+          <a:stretch>
+            <a:fillRect/>
+          </a:stretch>
+        </p:blipFill>
+        <p:spPr bwMode="auto">
+          <a:xfrm>
+            <a:off x="609600" y="2514600"/>
+            <a:ext cx="6705600" cy="2895600"/>
+          </a:xfrm>
+          <a:prstGeom prst="rect">
+            <a:avLst/>
+          </a:prstGeom>
+          <a:noFill/>
+          <a:ln>
+            <a:noFill/>
+          </a:ln>
+          <a:effectLst/>
+          <a:extLst>
+            <a:ext uri="{909E8E84-426E-40DD-AFC4-6F175D3DCCD1}">
+              <a14:hiddenFill xmlns:a14="http://schemas.microsoft.com/office/drawing/2010/main">
+                <a:solidFill>
+                  <a:schemeClr val="accent1"/>
+                </a:solidFill>
+              </a14:hiddenFill>
+            </a:ext>
+            <a:ext uri="{91240B29-F687-4F45-9708-019B960494DF}">
+              <a14:hiddenLine xmlns:a14="http://schemas.microsoft.com/office/drawing/2010/main" w="9525">
+                <a:solidFill>
+                  <a:schemeClr val="tx1"/>
+                </a:solidFill>
+                <a:miter lim="800000"/>
+                <a:headEnd/>
+                <a:tailEnd/>
+              </a14:hiddenLine>
+            </a:ext>
+            <a:ext uri="{AF507438-7753-43E0-B8FC-AC1667EBCBE1}">
+              <a14:hiddenEffects xmlns:a14="http://schemas.microsoft.com/office/drawing/2010/main">
+                <a:effectLst>
+                  <a:outerShdw dist="35921" dir="2700000" algn="ctr" rotWithShape="0">
+                    <a:schemeClr val="bg2"/>
+                  </a:outerShdw>
+                </a:effectLst>
+              </a14:hiddenEffects>
+            </a:ext>
+          </a:extLst>
+        </p:spPr>
+      </p:pic>
+      <p:pic>
+        <p:nvPicPr>
+          <p:cNvPr id="7171" name="Picture 3"/>
+          <p:cNvPicPr>
+            <a:picLocks noChangeAspect="1" noChangeArrowheads="1"/>
+          </p:cNvPicPr>
+          <p:nvPr/>
+        </p:nvPicPr>
+        <p:blipFill>
+          <a:blip r:embed="rId5" cstate="print">
+            <a:extLst>
+              <a:ext uri="{28A0092B-C50C-407E-A947-70E740481C1C}">
+                <a14:useLocalDpi xmlns:a14="http://schemas.microsoft.com/office/drawing/2010/main" val="0"/>
+              </a:ext>
+            </a:extLst>
+          </a:blip>
+          <a:srcRect/>
+          <a:stretch>
+            <a:fillRect/>
+          </a:stretch>
+        </p:blipFill>
+        <p:spPr bwMode="auto">
+          <a:xfrm>
+            <a:off x="640533" y="5524500"/>
+            <a:ext cx="6903267" cy="1268549"/>
+          </a:xfrm>
+          <a:prstGeom prst="rect">
+            <a:avLst/>
+          </a:prstGeom>
+          <a:noFill/>
+          <a:ln>
+            <a:noFill/>
+          </a:ln>
+          <a:effectLst/>
+          <a:extLst>
+            <a:ext uri="{909E8E84-426E-40DD-AFC4-6F175D3DCCD1}">
+              <a14:hiddenFill xmlns:a14="http://schemas.microsoft.com/office/drawing/2010/main">
+                <a:solidFill>
+                  <a:schemeClr val="accent1"/>
+                </a:solidFill>
+              </a14:hiddenFill>
+            </a:ext>
+            <a:ext uri="{91240B29-F687-4F45-9708-019B960494DF}">
+              <a14:hiddenLine xmlns:a14="http://schemas.microsoft.com/office/drawing/2010/main" w="9525">
+                <a:solidFill>
+                  <a:schemeClr val="tx1"/>
+                </a:solidFill>
+                <a:miter lim="800000"/>
+                <a:headEnd/>
+                <a:tailEnd/>
+              </a14:hiddenLine>
+            </a:ext>
+            <a:ext uri="{AF507438-7753-43E0-B8FC-AC1667EBCBE1}">
+              <a14:hiddenEffects xmlns:a14="http://schemas.microsoft.com/office/drawing/2010/main">
+                <a:effectLst>
+                  <a:outerShdw dist="35921" dir="2700000" algn="ctr" rotWithShape="0">
+                    <a:schemeClr val="bg2"/>
+                  </a:outerShdw>
+                </a:effectLst>
+              </a14:hiddenEffects>
+            </a:ext>
+          </a:extLst>
+        </p:spPr>
+      </p:pic>
+      <p:pic>
+        <p:nvPicPr>
+          <p:cNvPr id="7172" name="Picture 4"/>
+          <p:cNvPicPr>
+            <a:picLocks noChangeAspect="1" noChangeArrowheads="1"/>
+          </p:cNvPicPr>
+          <p:nvPr/>
+        </p:nvPicPr>
+        <p:blipFill>
+          <a:blip r:embed="rId6" cstate="print">
+            <a:extLst>
+              <a:ext uri="{28A0092B-C50C-407E-A947-70E740481C1C}">
+                <a14:useLocalDpi xmlns:a14="http://schemas.microsoft.com/office/drawing/2010/main" val="0"/>
+              </a:ext>
+            </a:extLst>
+          </a:blip>
+          <a:srcRect/>
+          <a:stretch>
+            <a:fillRect/>
+          </a:stretch>
+        </p:blipFill>
+        <p:spPr bwMode="auto">
+          <a:xfrm>
+            <a:off x="5867400" y="4191000"/>
+            <a:ext cx="2971800" cy="1075159"/>
+          </a:xfrm>
+          <a:prstGeom prst="rect">
+            <a:avLst/>
+          </a:prstGeom>
+          <a:noFill/>
+          <a:ln>
+            <a:noFill/>
+          </a:ln>
+          <a:effectLst/>
+          <a:extLst>
+            <a:ext uri="{909E8E84-426E-40DD-AFC4-6F175D3DCCD1}">
+              <a14:hiddenFill xmlns:a14="http://schemas.microsoft.com/office/drawing/2010/main">
+                <a:solidFill>
+                  <a:schemeClr val="accent1"/>
+                </a:solidFill>
+              </a14:hiddenFill>
+            </a:ext>
+            <a:ext uri="{91240B29-F687-4F45-9708-019B960494DF}">
+              <a14:hiddenLine xmlns:a14="http://schemas.microsoft.com/office/drawing/2010/main" w="9525">
+                <a:solidFill>
+                  <a:schemeClr val="tx1"/>
+                </a:solidFill>
+                <a:miter lim="800000"/>
+                <a:headEnd/>
+                <a:tailEnd/>
+              </a14:hiddenLine>
+            </a:ext>
+            <a:ext uri="{AF507438-7753-43E0-B8FC-AC1667EBCBE1}">
+              <a14:hiddenEffects xmlns:a14="http://schemas.microsoft.com/office/drawing/2010/main">
+                <a:effectLst>
+                  <a:outerShdw dist="35921" dir="2700000" algn="ctr" rotWithShape="0">
+                    <a:schemeClr val="bg2"/>
+                  </a:outerShdw>
+                </a:effectLst>
+              </a14:hiddenEffects>
+            </a:ext>
+          </a:extLst>
+        </p:spPr>
+      </p:pic>
+    </p:spTree>
+    <p:extLst>
+      <p:ext uri="{BB962C8B-B14F-4D97-AF65-F5344CB8AC3E}">
+        <p14:creationId xmlns:p14="http://schemas.microsoft.com/office/powerpoint/2010/main" val="3012790628"/>
+      </p:ext>
+    </p:extLst>
+  </p:cSld>
+  <p:clrMapOvr>
+    <a:masterClrMapping/>
+  </p:clrMapOvr>
+</p:sld>
+</file>
+
 <file path=ppt/slides/slide2.xml><?xml version="1.0" encoding="utf-8"?>
 <p:sld xmlns:a="http://schemas.openxmlformats.org/drawingml/2006/main" xmlns:r="http://schemas.openxmlformats.org/officeDocument/2006/relationships" xmlns:p="http://schemas.openxmlformats.org/presentationml/2006/main">
   <p:cSld>
@@ -3135,6 +4937,267 @@
       </p:grpSpPr>
       <p:sp>
         <p:nvSpPr>
+          <p:cNvPr id="2" name="Title 1"/>
+          <p:cNvSpPr>
+            <a:spLocks noGrp="1"/>
+          </p:cNvSpPr>
+          <p:nvPr>
+            <p:ph type="title"/>
+          </p:nvPr>
+        </p:nvSpPr>
+        <p:spPr/>
+        <p:txBody>
+          <a:bodyPr>
+            <a:normAutofit fontScale="90000"/>
+          </a:bodyPr>
+          <a:lstStyle/>
+          <a:p>
+            <a:r>
+              <a:rPr lang="en-IN" dirty="0">
+                <a:solidFill>
+                  <a:schemeClr val="bg2">
+                    <a:lumMod val="25000"/>
+                  </a:schemeClr>
+                </a:solidFill>
+              </a:rPr>
+              <a:t>STAGE 1 : First </a:t>
+            </a:r>
+            <a:r>
+              <a:rPr lang="en-IN" dirty="0" err="1">
+                <a:solidFill>
+                  <a:schemeClr val="bg2">
+                    <a:lumMod val="25000"/>
+                  </a:schemeClr>
+                </a:solidFill>
+              </a:rPr>
+              <a:t>Microservice</a:t>
+            </a:r>
+            <a:r>
+              <a:rPr lang="en-IN" dirty="0">
+                <a:solidFill>
+                  <a:schemeClr val="bg2">
+                    <a:lumMod val="25000"/>
+                  </a:schemeClr>
+                </a:solidFill>
+              </a:rPr>
+              <a:t> and its Deployment</a:t>
+            </a:r>
+            <a:endParaRPr lang="en-IN" dirty="0"/>
+          </a:p>
+        </p:txBody>
+      </p:sp>
+      <p:sp>
+        <p:nvSpPr>
+          <p:cNvPr id="3" name="Content Placeholder 2"/>
+          <p:cNvSpPr>
+            <a:spLocks noGrp="1"/>
+          </p:cNvSpPr>
+          <p:nvPr>
+            <p:ph idx="1"/>
+          </p:nvPr>
+        </p:nvSpPr>
+        <p:spPr/>
+        <p:txBody>
+          <a:bodyPr>
+            <a:normAutofit fontScale="92500" lnSpcReduction="20000"/>
+          </a:bodyPr>
+          <a:lstStyle/>
+          <a:p>
+            <a:pPr marL="0" indent="0">
+              <a:buNone/>
+            </a:pPr>
+            <a:r>
+              <a:rPr lang="en-IN" sz="2400" dirty="0" smtClean="0"/>
+              <a:t>GOAL : Write First </a:t>
+            </a:r>
+            <a:r>
+              <a:rPr lang="en-IN" sz="2400" dirty="0" err="1" smtClean="0"/>
+              <a:t>Microservice</a:t>
+            </a:r>
+            <a:r>
+              <a:rPr lang="en-IN" sz="2400" dirty="0" smtClean="0"/>
+              <a:t> and Run inside a K8s cluster.</a:t>
+            </a:r>
+          </a:p>
+          <a:p>
+            <a:pPr marL="0" indent="0">
+              <a:buNone/>
+            </a:pPr>
+            <a:endParaRPr lang="en-IN" sz="2400" dirty="0" smtClean="0"/>
+          </a:p>
+          <a:p>
+            <a:pPr marL="400050" lvl="1" indent="0">
+              <a:buNone/>
+            </a:pPr>
+            <a:r>
+              <a:rPr lang="en-IN" sz="2100" dirty="0"/>
+              <a:t>Step 1:</a:t>
+            </a:r>
+          </a:p>
+          <a:p>
+            <a:pPr marL="400050" lvl="1" indent="0">
+              <a:buNone/>
+            </a:pPr>
+            <a:r>
+              <a:rPr lang="en-IN" sz="2000" dirty="0"/>
+              <a:t>	</a:t>
+            </a:r>
+            <a:r>
+              <a:rPr lang="en-IN" sz="2000" dirty="0" smtClean="0"/>
+              <a:t> Create a REST Web API project – Platform Service. </a:t>
+            </a:r>
+          </a:p>
+          <a:p>
+            <a:pPr marL="400050" lvl="1" indent="0">
+              <a:buNone/>
+            </a:pPr>
+            <a:endParaRPr lang="en-IN" sz="2000" dirty="0" smtClean="0"/>
+          </a:p>
+          <a:p>
+            <a:pPr marL="400050" lvl="1" indent="0">
+              <a:buNone/>
+            </a:pPr>
+            <a:r>
+              <a:rPr lang="en-IN" sz="2000" dirty="0" smtClean="0"/>
+              <a:t>Step 2:</a:t>
+            </a:r>
+          </a:p>
+          <a:p>
+            <a:pPr marL="400050" lvl="1" indent="0">
+              <a:buNone/>
+            </a:pPr>
+            <a:r>
+              <a:rPr lang="en-IN" sz="2000" dirty="0"/>
+              <a:t>	</a:t>
+            </a:r>
+            <a:r>
+              <a:rPr lang="en-IN" sz="2000" dirty="0" smtClean="0"/>
+              <a:t> Create </a:t>
+            </a:r>
+            <a:r>
+              <a:rPr lang="en-IN" sz="2000" dirty="0" err="1" smtClean="0"/>
+              <a:t>Docker</a:t>
+            </a:r>
+            <a:r>
+              <a:rPr lang="en-IN" sz="2000" dirty="0" smtClean="0"/>
+              <a:t> Image and Push it to </a:t>
+            </a:r>
+            <a:r>
+              <a:rPr lang="en-IN" sz="2000" dirty="0" err="1" smtClean="0"/>
+              <a:t>Docker</a:t>
+            </a:r>
+            <a:r>
+              <a:rPr lang="en-IN" sz="2000" dirty="0" smtClean="0"/>
+              <a:t> hub.</a:t>
+            </a:r>
+          </a:p>
+          <a:p>
+            <a:pPr marL="400050" lvl="1" indent="0">
+              <a:buNone/>
+            </a:pPr>
+            <a:endParaRPr lang="en-IN" sz="2000" dirty="0" smtClean="0"/>
+          </a:p>
+          <a:p>
+            <a:pPr marL="400050" lvl="1" indent="0">
+              <a:buNone/>
+            </a:pPr>
+            <a:r>
+              <a:rPr lang="en-IN" sz="2000" dirty="0" smtClean="0"/>
+              <a:t>Step 3:</a:t>
+            </a:r>
+          </a:p>
+          <a:p>
+            <a:pPr marL="400050" lvl="1" indent="0">
+              <a:buNone/>
+            </a:pPr>
+            <a:r>
+              <a:rPr lang="en-IN" sz="2000" dirty="0"/>
+              <a:t>	</a:t>
+            </a:r>
+            <a:r>
+              <a:rPr lang="en-IN" sz="2000" dirty="0" smtClean="0"/>
+              <a:t> Create Deployment file to run </a:t>
+            </a:r>
+            <a:r>
+              <a:rPr lang="en-IN" sz="2000" dirty="0" err="1" smtClean="0"/>
+              <a:t>microservice</a:t>
+            </a:r>
+            <a:r>
+              <a:rPr lang="en-IN" sz="2000" dirty="0" smtClean="0"/>
+              <a:t> as Pods inside K8s environment.</a:t>
+            </a:r>
+          </a:p>
+          <a:p>
+            <a:pPr marL="400050" lvl="1" indent="0">
+              <a:buNone/>
+            </a:pPr>
+            <a:endParaRPr lang="en-IN" sz="2000" dirty="0" smtClean="0"/>
+          </a:p>
+          <a:p>
+            <a:pPr marL="400050" lvl="1" indent="0">
+              <a:buNone/>
+            </a:pPr>
+            <a:r>
+              <a:rPr lang="en-IN" sz="2000" dirty="0" smtClean="0"/>
+              <a:t>Step 4: </a:t>
+            </a:r>
+          </a:p>
+          <a:p>
+            <a:pPr marL="400050" lvl="1" indent="0">
+              <a:buNone/>
+            </a:pPr>
+            <a:r>
+              <a:rPr lang="en-IN" sz="2000" dirty="0"/>
+              <a:t>	</a:t>
+            </a:r>
+            <a:r>
+              <a:rPr lang="en-IN" sz="2000" dirty="0" smtClean="0"/>
+              <a:t>Create </a:t>
+            </a:r>
+            <a:r>
+              <a:rPr lang="en-IN" sz="2000" dirty="0" err="1" smtClean="0"/>
+              <a:t>NodePort</a:t>
+            </a:r>
+            <a:r>
+              <a:rPr lang="en-IN" sz="2000" dirty="0" smtClean="0"/>
+              <a:t> Service for accessing Platform Service running inside Pod.</a:t>
+            </a:r>
+            <a:endParaRPr lang="en-IN" sz="2000" dirty="0"/>
+          </a:p>
+        </p:txBody>
+      </p:sp>
+    </p:spTree>
+    <p:extLst>
+      <p:ext uri="{BB962C8B-B14F-4D97-AF65-F5344CB8AC3E}">
+        <p14:creationId xmlns:p14="http://schemas.microsoft.com/office/powerpoint/2010/main" val="2778761129"/>
+      </p:ext>
+    </p:extLst>
+  </p:cSld>
+  <p:clrMapOvr>
+    <a:masterClrMapping/>
+  </p:clrMapOvr>
+</p:sld>
+</file>
+
+<file path=ppt/slides/slide3.xml><?xml version="1.0" encoding="utf-8"?>
+<p:sld xmlns:a="http://schemas.openxmlformats.org/drawingml/2006/main" xmlns:r="http://schemas.openxmlformats.org/officeDocument/2006/relationships" xmlns:p="http://schemas.openxmlformats.org/presentationml/2006/main">
+  <p:cSld>
+    <p:spTree>
+      <p:nvGrpSpPr>
+        <p:cNvPr id="1" name=""/>
+        <p:cNvGrpSpPr/>
+        <p:nvPr/>
+      </p:nvGrpSpPr>
+      <p:grpSpPr>
+        <a:xfrm>
+          <a:off x="0" y="0"/>
+          <a:ext cx="0" cy="0"/>
+          <a:chOff x="0" y="0"/>
+          <a:chExt cx="0" cy="0"/>
+        </a:xfrm>
+      </p:grpSpPr>
+      <p:sp>
+        <p:nvSpPr>
           <p:cNvPr id="3" name="Content Placeholder 2"/>
           <p:cNvSpPr>
             <a:spLocks noGrp="1"/>
@@ -3151,16 +5214,65 @@
         </p:spPr>
         <p:txBody>
           <a:bodyPr>
-            <a:normAutofit lnSpcReduction="10000"/>
+            <a:normAutofit fontScale="92500" lnSpcReduction="20000"/>
           </a:bodyPr>
           <a:lstStyle/>
           <a:p>
+            <a:pPr marL="0" indent="0">
+              <a:buNone/>
+            </a:pPr>
+            <a:r>
+              <a:rPr lang="en-IN" sz="1900" b="1" dirty="0" smtClean="0"/>
+              <a:t>Step 1: Create a </a:t>
+            </a:r>
+            <a:r>
+              <a:rPr lang="en-IN" sz="1900" b="1" dirty="0" err="1" smtClean="0"/>
+              <a:t>RESTFul</a:t>
+            </a:r>
+            <a:r>
+              <a:rPr lang="en-IN" sz="1900" b="1" dirty="0"/>
+              <a:t> </a:t>
+            </a:r>
+            <a:r>
+              <a:rPr lang="en-IN" sz="1900" b="1" dirty="0" err="1"/>
+              <a:t>WebApi</a:t>
+            </a:r>
+            <a:r>
+              <a:rPr lang="en-IN" sz="1900" b="1" dirty="0"/>
+              <a:t> </a:t>
+            </a:r>
+            <a:r>
+              <a:rPr lang="en-IN" sz="1900" b="1" dirty="0" smtClean="0"/>
+              <a:t>for – </a:t>
+            </a:r>
+          </a:p>
+          <a:p>
+            <a:pPr marL="0" indent="0">
+              <a:buNone/>
+            </a:pPr>
+            <a:r>
+              <a:rPr lang="en-IN" sz="1900" b="1" dirty="0" smtClean="0"/>
+              <a:t>Platform Service</a:t>
+            </a:r>
+            <a:endParaRPr lang="en-IN" sz="1900" b="1" dirty="0" smtClean="0"/>
+          </a:p>
+          <a:p>
             <a:pPr marL="228600" indent="-228600">
               <a:buAutoNum type="arabicParenR"/>
             </a:pPr>
+            <a:endParaRPr lang="en-IN" sz="1200" dirty="0" smtClean="0"/>
+          </a:p>
+          <a:p>
+            <a:pPr marL="228600" indent="-228600">
+              <a:buAutoNum type="arabicParenR"/>
+            </a:pPr>
             <a:r>
               <a:rPr lang="en-IN" sz="1200" dirty="0" smtClean="0"/>
-              <a:t>Scaffold a new </a:t>
+              <a:t>Scaffold </a:t>
+            </a:r>
+            <a:r>
+              <a:rPr lang="en-IN" sz="1200" dirty="0" smtClean="0"/>
+              <a:t>a new </a:t>
             </a:r>
             <a:r>
               <a:rPr lang="en-IN" sz="1200" dirty="0" err="1" smtClean="0"/>
@@ -3486,14 +5598,48 @@
         </p:nvSpPr>
         <p:spPr/>
         <p:txBody>
-          <a:bodyPr/>
+          <a:bodyPr>
+            <a:normAutofit fontScale="90000"/>
+          </a:bodyPr>
           <a:lstStyle/>
           <a:p>
             <a:r>
-              <a:rPr lang="en-IN" dirty="0" smtClean="0"/>
-              <a:t>Platform Service</a:t>
-            </a:r>
-            <a:endParaRPr lang="en-IN" dirty="0"/>
+              <a:rPr lang="en-IN" dirty="0" smtClean="0">
+                <a:solidFill>
+                  <a:schemeClr val="bg2">
+                    <a:lumMod val="25000"/>
+                  </a:schemeClr>
+                </a:solidFill>
+              </a:rPr>
+              <a:t>STAGE 1 : First </a:t>
+            </a:r>
+            <a:r>
+              <a:rPr lang="en-IN" dirty="0" err="1" smtClean="0">
+                <a:solidFill>
+                  <a:schemeClr val="bg2">
+                    <a:lumMod val="25000"/>
+                  </a:schemeClr>
+                </a:solidFill>
+              </a:rPr>
+              <a:t>Microservice</a:t>
+            </a:r>
+            <a:r>
+              <a:rPr lang="en-IN" dirty="0" smtClean="0">
+                <a:solidFill>
+                  <a:schemeClr val="bg2">
+                    <a:lumMod val="25000"/>
+                  </a:schemeClr>
+                </a:solidFill>
+              </a:rPr>
+              <a:t> and its Deployment</a:t>
+            </a:r>
+            <a:endParaRPr lang="en-IN" dirty="0">
+              <a:solidFill>
+                <a:schemeClr val="bg2">
+                  <a:lumMod val="25000"/>
+                </a:schemeClr>
+              </a:solidFill>
+            </a:endParaRPr>
           </a:p>
         </p:txBody>
       </p:sp>
@@ -3846,7 +5992,7 @@
 </p:sld>
 </file>
 
-<file path=ppt/slides/slide3.xml><?xml version="1.0" encoding="utf-8"?>
+<file path=ppt/slides/slide4.xml><?xml version="1.0" encoding="utf-8"?>
 <p:sld xmlns:a="http://schemas.openxmlformats.org/drawingml/2006/main" xmlns:r="http://schemas.openxmlformats.org/officeDocument/2006/relationships" xmlns:p="http://schemas.openxmlformats.org/presentationml/2006/main">
   <p:cSld>
     <p:spTree>
@@ -3875,7 +6021,7 @@
         </p:nvSpPr>
         <p:spPr>
           <a:xfrm>
-            <a:off x="457200" y="457200"/>
+            <a:off x="533400" y="1447800"/>
             <a:ext cx="8229600" cy="5668963"/>
           </a:xfrm>
         </p:spPr>
@@ -4091,19 +6237,184 @@
             </a:pPr>
             <a:r>
               <a:rPr lang="en-IN" sz="1200" dirty="0" smtClean="0"/>
-              <a:t>9. </a:t>
-            </a:r>
-            <a:r>
-              <a:rPr lang="en-IN" sz="1200" smtClean="0"/>
-              <a:t>Implement Controllers</a:t>
-            </a:r>
+              <a:t>9. Implement </a:t>
+            </a:r>
+            <a:r>
+              <a:rPr lang="en-IN" sz="1200" dirty="0" smtClean="0"/>
+              <a:t>Controllers</a:t>
+            </a:r>
+          </a:p>
+          <a:p>
+            <a:pPr marL="0" indent="0">
+              <a:buNone/>
+            </a:pPr>
             <a:endParaRPr lang="en-IN" sz="1200" dirty="0" smtClean="0"/>
           </a:p>
           <a:p>
             <a:pPr marL="0" indent="0">
               <a:buNone/>
             </a:pPr>
+            <a:r>
+              <a:rPr lang="en-IN" sz="2000" b="1" dirty="0"/>
+              <a:t>Step </a:t>
+            </a:r>
+            <a:r>
+              <a:rPr lang="en-IN" sz="2000" b="1" dirty="0" smtClean="0"/>
+              <a:t>2: Create </a:t>
+            </a:r>
+            <a:r>
+              <a:rPr lang="en-IN" sz="2000" b="1" dirty="0" err="1" smtClean="0"/>
+              <a:t>Docker</a:t>
+            </a:r>
+            <a:r>
+              <a:rPr lang="en-IN" sz="2000" b="1" dirty="0" smtClean="0"/>
+              <a:t> Image and Test Container</a:t>
+            </a:r>
+          </a:p>
+          <a:p>
+            <a:pPr marL="0" indent="0">
+              <a:buNone/>
+            </a:pPr>
             <a:endParaRPr lang="en-IN" sz="1200" dirty="0"/>
+          </a:p>
+          <a:p>
+            <a:pPr marL="228600" indent="-228600">
+              <a:buAutoNum type="arabicPeriod"/>
+            </a:pPr>
+            <a:r>
+              <a:rPr lang="en-IN" sz="1200" dirty="0" smtClean="0"/>
+              <a:t>Create a </a:t>
+            </a:r>
+            <a:r>
+              <a:rPr lang="en-IN" sz="1200" dirty="0" err="1" smtClean="0"/>
+              <a:t>Docker</a:t>
+            </a:r>
+            <a:r>
+              <a:rPr lang="en-IN" sz="1200" dirty="0" smtClean="0"/>
+              <a:t> File and build </a:t>
+            </a:r>
+            <a:r>
+              <a:rPr lang="en-IN" sz="1200" dirty="0" err="1" smtClean="0"/>
+              <a:t>docker</a:t>
+            </a:r>
+            <a:r>
+              <a:rPr lang="en-IN" sz="1200" dirty="0" smtClean="0"/>
+              <a:t> image.</a:t>
+            </a:r>
+          </a:p>
+          <a:p>
+            <a:pPr marL="228600" indent="-228600">
+              <a:buAutoNum type="arabicPeriod"/>
+            </a:pPr>
+            <a:r>
+              <a:rPr lang="en-IN" sz="1200" dirty="0" smtClean="0"/>
+              <a:t>Test the </a:t>
+            </a:r>
+            <a:r>
+              <a:rPr lang="en-IN" sz="1200" dirty="0" err="1" smtClean="0"/>
+              <a:t>Docker</a:t>
+            </a:r>
+            <a:r>
+              <a:rPr lang="en-IN" sz="1200" dirty="0" smtClean="0"/>
+              <a:t> image by running a container. </a:t>
+            </a:r>
+          </a:p>
+          <a:p>
+            <a:pPr marL="0" indent="0">
+              <a:buNone/>
+            </a:pPr>
+            <a:r>
+              <a:rPr lang="en-IN" sz="1200" dirty="0" smtClean="0"/>
+              <a:t>Use port mapping for accessing the container and test the </a:t>
+            </a:r>
+            <a:r>
+              <a:rPr lang="en-IN" sz="1200" dirty="0" err="1" smtClean="0"/>
+              <a:t>api</a:t>
+            </a:r>
+            <a:r>
+              <a:rPr lang="en-IN" sz="1200" dirty="0" smtClean="0"/>
+              <a:t>.</a:t>
+            </a:r>
+          </a:p>
+          <a:p>
+            <a:pPr marL="0" indent="0">
+              <a:buNone/>
+            </a:pPr>
+            <a:endParaRPr lang="en-IN" sz="1200" dirty="0"/>
+          </a:p>
+          <a:p>
+            <a:pPr marL="0" indent="0">
+              <a:buNone/>
+            </a:pPr>
+            <a:endParaRPr lang="en-IN" sz="1200" dirty="0" smtClean="0"/>
+          </a:p>
+          <a:p>
+            <a:pPr marL="0" indent="0">
+              <a:buNone/>
+            </a:pPr>
+            <a:endParaRPr lang="en-IN" sz="1200" dirty="0"/>
+          </a:p>
+        </p:txBody>
+      </p:sp>
+      <p:sp>
+        <p:nvSpPr>
+          <p:cNvPr id="4" name="Title 1"/>
+          <p:cNvSpPr>
+            <a:spLocks noGrp="1"/>
+          </p:cNvSpPr>
+          <p:nvPr>
+            <p:ph type="title"/>
+          </p:nvPr>
+        </p:nvSpPr>
+        <p:spPr>
+          <a:xfrm>
+            <a:off x="457200" y="274638"/>
+            <a:ext cx="8229600" cy="1143000"/>
+          </a:xfrm>
+        </p:spPr>
+        <p:txBody>
+          <a:bodyPr>
+            <a:normAutofit fontScale="90000"/>
+          </a:bodyPr>
+          <a:lstStyle/>
+          <a:p>
+            <a:r>
+              <a:rPr lang="en-IN" dirty="0" smtClean="0">
+                <a:solidFill>
+                  <a:schemeClr val="bg2">
+                    <a:lumMod val="25000"/>
+                  </a:schemeClr>
+                </a:solidFill>
+              </a:rPr>
+              <a:t>STAGE 1 : First </a:t>
+            </a:r>
+            <a:r>
+              <a:rPr lang="en-IN" dirty="0" err="1" smtClean="0">
+                <a:solidFill>
+                  <a:schemeClr val="bg2">
+                    <a:lumMod val="25000"/>
+                  </a:schemeClr>
+                </a:solidFill>
+              </a:rPr>
+              <a:t>Microservice</a:t>
+            </a:r>
+            <a:r>
+              <a:rPr lang="en-IN" dirty="0" smtClean="0">
+                <a:solidFill>
+                  <a:schemeClr val="bg2">
+                    <a:lumMod val="25000"/>
+                  </a:schemeClr>
+                </a:solidFill>
+              </a:rPr>
+              <a:t> and its Deployment</a:t>
+            </a:r>
+            <a:endParaRPr lang="en-IN" dirty="0">
+              <a:solidFill>
+                <a:schemeClr val="bg2">
+                  <a:lumMod val="25000"/>
+                </a:schemeClr>
+              </a:solidFill>
+            </a:endParaRPr>
           </a:p>
         </p:txBody>
       </p:sp>
@@ -4111,6 +6422,1607 @@
     <p:extLst>
       <p:ext uri="{BB962C8B-B14F-4D97-AF65-F5344CB8AC3E}">
         <p14:creationId xmlns:p14="http://schemas.microsoft.com/office/powerpoint/2010/main" val="3309607211"/>
+      </p:ext>
+    </p:extLst>
+  </p:cSld>
+  <p:clrMapOvr>
+    <a:masterClrMapping/>
+  </p:clrMapOvr>
+</p:sld>
+</file>
+
+<file path=ppt/slides/slide5.xml><?xml version="1.0" encoding="utf-8"?>
+<p:sld xmlns:a="http://schemas.openxmlformats.org/drawingml/2006/main" xmlns:r="http://schemas.openxmlformats.org/officeDocument/2006/relationships" xmlns:p="http://schemas.openxmlformats.org/presentationml/2006/main">
+  <p:cSld>
+    <p:bg>
+      <p:bgRef idx="1001">
+        <a:schemeClr val="bg1"/>
+      </p:bgRef>
+    </p:bg>
+    <p:spTree>
+      <p:nvGrpSpPr>
+        <p:cNvPr id="1" name=""/>
+        <p:cNvGrpSpPr/>
+        <p:nvPr/>
+      </p:nvGrpSpPr>
+      <p:grpSpPr>
+        <a:xfrm>
+          <a:off x="0" y="0"/>
+          <a:ext cx="0" cy="0"/>
+          <a:chOff x="0" y="0"/>
+          <a:chExt cx="0" cy="0"/>
+        </a:xfrm>
+      </p:grpSpPr>
+      <p:sp>
+        <p:nvSpPr>
+          <p:cNvPr id="3" name="Content Placeholder 2"/>
+          <p:cNvSpPr>
+            <a:spLocks noGrp="1"/>
+          </p:cNvSpPr>
+          <p:nvPr>
+            <p:ph idx="1"/>
+          </p:nvPr>
+        </p:nvSpPr>
+        <p:spPr>
+          <a:xfrm>
+            <a:off x="457200" y="1524000"/>
+            <a:ext cx="8229600" cy="4602163"/>
+          </a:xfrm>
+        </p:spPr>
+        <p:txBody>
+          <a:bodyPr/>
+          <a:lstStyle/>
+          <a:p>
+            <a:pPr marL="0" indent="0">
+              <a:buNone/>
+            </a:pPr>
+            <a:endParaRPr lang="en-IN" sz="1800" dirty="0"/>
+          </a:p>
+          <a:p>
+            <a:pPr marL="0" indent="0">
+              <a:buNone/>
+            </a:pPr>
+            <a:r>
+              <a:rPr lang="en-IN" sz="2000" b="1" dirty="0"/>
+              <a:t>Step 3: Deploy the first </a:t>
+            </a:r>
+            <a:r>
+              <a:rPr lang="en-IN" sz="2000" b="1" dirty="0" err="1"/>
+              <a:t>microservice</a:t>
+            </a:r>
+            <a:r>
+              <a:rPr lang="en-IN" sz="2000" b="1" dirty="0"/>
+              <a:t> in K8s </a:t>
+            </a:r>
+            <a:r>
+              <a:rPr lang="en-IN" sz="2000" b="1" dirty="0" smtClean="0"/>
+              <a:t>as Pods</a:t>
+            </a:r>
+          </a:p>
+          <a:p>
+            <a:pPr marL="0" indent="0">
+              <a:buNone/>
+            </a:pPr>
+            <a:endParaRPr lang="en-IN" sz="1200" dirty="0" smtClean="0"/>
+          </a:p>
+          <a:p>
+            <a:pPr marL="0" indent="0">
+              <a:buNone/>
+            </a:pPr>
+            <a:r>
+              <a:rPr lang="en-IN" sz="1200" dirty="0" smtClean="0"/>
+              <a:t>1</a:t>
+            </a:r>
+            <a:r>
+              <a:rPr lang="en-IN" sz="1200" dirty="0"/>
+              <a:t>) </a:t>
+            </a:r>
+            <a:r>
+              <a:rPr lang="en-IN" sz="1200" dirty="0" smtClean="0"/>
+              <a:t>Create first </a:t>
+            </a:r>
+            <a:r>
+              <a:rPr lang="en-IN" sz="1200" dirty="0" err="1" smtClean="0"/>
+              <a:t>microservice</a:t>
+            </a:r>
+            <a:r>
+              <a:rPr lang="en-IN" sz="1200" dirty="0" smtClean="0"/>
+              <a:t> Deployment in k8s cluster.</a:t>
+            </a:r>
+          </a:p>
+          <a:p>
+            <a:pPr marL="0" indent="0">
+              <a:buNone/>
+            </a:pPr>
+            <a:endParaRPr lang="en-IN" sz="1200" dirty="0" smtClean="0"/>
+          </a:p>
+          <a:p>
+            <a:pPr marL="0" indent="0">
+              <a:buNone/>
+            </a:pPr>
+            <a:endParaRPr lang="en-IN" sz="1200" dirty="0"/>
+          </a:p>
+          <a:p>
+            <a:pPr marL="0" indent="0">
+              <a:buNone/>
+            </a:pPr>
+            <a:endParaRPr lang="en-IN" sz="1200" dirty="0" smtClean="0"/>
+          </a:p>
+          <a:p>
+            <a:pPr marL="0" indent="0">
+              <a:buNone/>
+            </a:pPr>
+            <a:endParaRPr lang="en-IN" sz="1200" dirty="0"/>
+          </a:p>
+          <a:p>
+            <a:pPr marL="0" indent="0">
+              <a:buNone/>
+            </a:pPr>
+            <a:endParaRPr lang="en-IN" sz="1200" dirty="0" smtClean="0"/>
+          </a:p>
+          <a:p>
+            <a:pPr marL="0" indent="0">
+              <a:buNone/>
+            </a:pPr>
+            <a:endParaRPr lang="en-IN" sz="1200" dirty="0"/>
+          </a:p>
+          <a:p>
+            <a:pPr marL="0" indent="0">
+              <a:buNone/>
+            </a:pPr>
+            <a:endParaRPr lang="en-IN" sz="1200" dirty="0" smtClean="0"/>
+          </a:p>
+          <a:p>
+            <a:pPr marL="0" indent="0">
+              <a:buNone/>
+            </a:pPr>
+            <a:endParaRPr lang="en-IN" sz="1200" dirty="0"/>
+          </a:p>
+          <a:p>
+            <a:pPr marL="0" indent="0">
+              <a:buNone/>
+            </a:pPr>
+            <a:endParaRPr lang="en-IN" sz="1200" dirty="0" smtClean="0"/>
+          </a:p>
+          <a:p>
+            <a:pPr marL="0" indent="0">
+              <a:buNone/>
+            </a:pPr>
+            <a:endParaRPr lang="en-IN" sz="1200" dirty="0"/>
+          </a:p>
+          <a:p>
+            <a:pPr marL="0" indent="0">
+              <a:buNone/>
+            </a:pPr>
+            <a:endParaRPr lang="en-IN" sz="1200" dirty="0" smtClean="0"/>
+          </a:p>
+          <a:p>
+            <a:pPr marL="0" indent="0">
+              <a:buNone/>
+            </a:pPr>
+            <a:endParaRPr lang="en-IN" sz="1200" dirty="0"/>
+          </a:p>
+          <a:p>
+            <a:pPr marL="0" indent="0">
+              <a:buNone/>
+            </a:pPr>
+            <a:endParaRPr lang="en-IN" sz="1200" dirty="0" smtClean="0"/>
+          </a:p>
+          <a:p>
+            <a:pPr marL="0" indent="0">
+              <a:buNone/>
+            </a:pPr>
+            <a:endParaRPr lang="en-IN" sz="1200" dirty="0"/>
+          </a:p>
+          <a:p>
+            <a:pPr marL="0" indent="0">
+              <a:buNone/>
+            </a:pPr>
+            <a:endParaRPr lang="en-IN" sz="1200" dirty="0" smtClean="0"/>
+          </a:p>
+          <a:p>
+            <a:pPr marL="0" indent="0">
+              <a:buNone/>
+            </a:pPr>
+            <a:endParaRPr lang="en-IN" sz="1200" dirty="0"/>
+          </a:p>
+          <a:p>
+            <a:pPr marL="0" indent="0">
+              <a:buNone/>
+            </a:pPr>
+            <a:endParaRPr lang="en-IN" sz="1200" dirty="0" smtClean="0"/>
+          </a:p>
+          <a:p>
+            <a:pPr marL="0" indent="0">
+              <a:buNone/>
+            </a:pPr>
+            <a:endParaRPr lang="en-IN" sz="1200" dirty="0"/>
+          </a:p>
+          <a:p>
+            <a:pPr marL="0" indent="0">
+              <a:buNone/>
+            </a:pPr>
+            <a:endParaRPr lang="en-IN" sz="1200" dirty="0" smtClean="0"/>
+          </a:p>
+          <a:p>
+            <a:pPr marL="0" indent="0">
+              <a:buNone/>
+            </a:pPr>
+            <a:endParaRPr lang="en-IN" sz="1200" dirty="0"/>
+          </a:p>
+          <a:p>
+            <a:pPr marL="0" indent="0">
+              <a:buNone/>
+            </a:pPr>
+            <a:endParaRPr lang="en-IN" sz="1200" dirty="0" smtClean="0"/>
+          </a:p>
+          <a:p>
+            <a:pPr marL="0" indent="0">
+              <a:buNone/>
+            </a:pPr>
+            <a:endParaRPr lang="en-IN" sz="1200" dirty="0"/>
+          </a:p>
+          <a:p>
+            <a:pPr marL="0" indent="0">
+              <a:buNone/>
+            </a:pPr>
+            <a:endParaRPr lang="en-IN" sz="1200" dirty="0" smtClean="0"/>
+          </a:p>
+          <a:p>
+            <a:pPr marL="0" indent="0">
+              <a:buNone/>
+            </a:pPr>
+            <a:endParaRPr lang="en-IN" sz="1200" dirty="0"/>
+          </a:p>
+          <a:p>
+            <a:pPr marL="0" indent="0">
+              <a:buNone/>
+            </a:pPr>
+            <a:endParaRPr lang="en-IN" sz="1200" dirty="0" smtClean="0"/>
+          </a:p>
+          <a:p>
+            <a:pPr marL="0" indent="0">
+              <a:buNone/>
+            </a:pPr>
+            <a:endParaRPr lang="en-IN" sz="1200" dirty="0"/>
+          </a:p>
+          <a:p>
+            <a:pPr marL="0" indent="0">
+              <a:buNone/>
+            </a:pPr>
+            <a:endParaRPr lang="en-IN" sz="1200" dirty="0" smtClean="0"/>
+          </a:p>
+          <a:p>
+            <a:pPr marL="0" indent="0">
+              <a:buNone/>
+            </a:pPr>
+            <a:endParaRPr lang="en-IN" sz="1200" dirty="0"/>
+          </a:p>
+          <a:p>
+            <a:pPr marL="0" indent="0">
+              <a:buNone/>
+            </a:pPr>
+            <a:endParaRPr lang="en-IN" sz="1200" dirty="0" smtClean="0"/>
+          </a:p>
+          <a:p>
+            <a:pPr marL="0" indent="0">
+              <a:buNone/>
+            </a:pPr>
+            <a:endParaRPr lang="en-IN" sz="1200" dirty="0"/>
+          </a:p>
+        </p:txBody>
+      </p:sp>
+      <p:pic>
+        <p:nvPicPr>
+          <p:cNvPr id="1026" name="Picture 2"/>
+          <p:cNvPicPr>
+            <a:picLocks noChangeAspect="1" noChangeArrowheads="1"/>
+          </p:cNvPicPr>
+          <p:nvPr/>
+        </p:nvPicPr>
+        <p:blipFill>
+          <a:blip r:embed="rId3" cstate="print">
+            <a:extLst>
+              <a:ext uri="{28A0092B-C50C-407E-A947-70E740481C1C}">
+                <a14:useLocalDpi xmlns:a14="http://schemas.microsoft.com/office/drawing/2010/main" val="0"/>
+              </a:ext>
+            </a:extLst>
+          </a:blip>
+          <a:srcRect/>
+          <a:stretch>
+            <a:fillRect/>
+          </a:stretch>
+        </p:blipFill>
+        <p:spPr bwMode="auto">
+          <a:xfrm>
+            <a:off x="762000" y="2743200"/>
+            <a:ext cx="5189537" cy="2955743"/>
+          </a:xfrm>
+          <a:prstGeom prst="rect">
+            <a:avLst/>
+          </a:prstGeom>
+          <a:noFill/>
+          <a:ln>
+            <a:noFill/>
+          </a:ln>
+          <a:effectLst/>
+          <a:extLst>
+            <a:ext uri="{909E8E84-426E-40DD-AFC4-6F175D3DCCD1}">
+              <a14:hiddenFill xmlns:a14="http://schemas.microsoft.com/office/drawing/2010/main">
+                <a:solidFill>
+                  <a:schemeClr val="accent1"/>
+                </a:solidFill>
+              </a14:hiddenFill>
+            </a:ext>
+            <a:ext uri="{91240B29-F687-4F45-9708-019B960494DF}">
+              <a14:hiddenLine xmlns:a14="http://schemas.microsoft.com/office/drawing/2010/main" w="9525">
+                <a:solidFill>
+                  <a:schemeClr val="tx1"/>
+                </a:solidFill>
+                <a:miter lim="800000"/>
+                <a:headEnd/>
+                <a:tailEnd/>
+              </a14:hiddenLine>
+            </a:ext>
+            <a:ext uri="{AF507438-7753-43E0-B8FC-AC1667EBCBE1}">
+              <a14:hiddenEffects xmlns:a14="http://schemas.microsoft.com/office/drawing/2010/main">
+                <a:effectLst>
+                  <a:outerShdw dist="35921" dir="2700000" algn="ctr" rotWithShape="0">
+                    <a:schemeClr val="bg2"/>
+                  </a:outerShdw>
+                </a:effectLst>
+              </a14:hiddenEffects>
+            </a:ext>
+          </a:extLst>
+        </p:spPr>
+      </p:pic>
+      <p:pic>
+        <p:nvPicPr>
+          <p:cNvPr id="1027" name="Picture 3"/>
+          <p:cNvPicPr>
+            <a:picLocks noChangeAspect="1" noChangeArrowheads="1"/>
+          </p:cNvPicPr>
+          <p:nvPr/>
+        </p:nvPicPr>
+        <p:blipFill>
+          <a:blip r:embed="rId4" cstate="print">
+            <a:extLst>
+              <a:ext uri="{28A0092B-C50C-407E-A947-70E740481C1C}">
+                <a14:useLocalDpi xmlns:a14="http://schemas.microsoft.com/office/drawing/2010/main" val="0"/>
+              </a:ext>
+            </a:extLst>
+          </a:blip>
+          <a:srcRect/>
+          <a:stretch>
+            <a:fillRect/>
+          </a:stretch>
+        </p:blipFill>
+        <p:spPr bwMode="auto">
+          <a:xfrm>
+            <a:off x="741630" y="6003202"/>
+            <a:ext cx="5341937" cy="514350"/>
+          </a:xfrm>
+          <a:prstGeom prst="rect">
+            <a:avLst/>
+          </a:prstGeom>
+          <a:noFill/>
+          <a:ln>
+            <a:noFill/>
+          </a:ln>
+          <a:effectLst/>
+          <a:extLst>
+            <a:ext uri="{909E8E84-426E-40DD-AFC4-6F175D3DCCD1}">
+              <a14:hiddenFill xmlns:a14="http://schemas.microsoft.com/office/drawing/2010/main">
+                <a:solidFill>
+                  <a:schemeClr val="accent1"/>
+                </a:solidFill>
+              </a14:hiddenFill>
+            </a:ext>
+            <a:ext uri="{91240B29-F687-4F45-9708-019B960494DF}">
+              <a14:hiddenLine xmlns:a14="http://schemas.microsoft.com/office/drawing/2010/main" w="9525">
+                <a:solidFill>
+                  <a:schemeClr val="tx1"/>
+                </a:solidFill>
+                <a:miter lim="800000"/>
+                <a:headEnd/>
+                <a:tailEnd/>
+              </a14:hiddenLine>
+            </a:ext>
+            <a:ext uri="{AF507438-7753-43E0-B8FC-AC1667EBCBE1}">
+              <a14:hiddenEffects xmlns:a14="http://schemas.microsoft.com/office/drawing/2010/main">
+                <a:effectLst>
+                  <a:outerShdw dist="35921" dir="2700000" algn="ctr" rotWithShape="0">
+                    <a:schemeClr val="bg2"/>
+                  </a:outerShdw>
+                </a:effectLst>
+              </a14:hiddenEffects>
+            </a:ext>
+          </a:extLst>
+        </p:spPr>
+      </p:pic>
+      <p:sp>
+        <p:nvSpPr>
+          <p:cNvPr id="6" name="Title 1"/>
+          <p:cNvSpPr>
+            <a:spLocks noGrp="1"/>
+          </p:cNvSpPr>
+          <p:nvPr>
+            <p:ph type="title"/>
+          </p:nvPr>
+        </p:nvSpPr>
+        <p:spPr>
+          <a:xfrm>
+            <a:off x="457200" y="274638"/>
+            <a:ext cx="8229600" cy="1143000"/>
+          </a:xfrm>
+        </p:spPr>
+        <p:txBody>
+          <a:bodyPr>
+            <a:normAutofit fontScale="90000"/>
+          </a:bodyPr>
+          <a:lstStyle/>
+          <a:p>
+            <a:r>
+              <a:rPr lang="en-IN" dirty="0" smtClean="0">
+                <a:solidFill>
+                  <a:schemeClr val="bg2">
+                    <a:lumMod val="25000"/>
+                  </a:schemeClr>
+                </a:solidFill>
+              </a:rPr>
+              <a:t>STAGE 1 : First </a:t>
+            </a:r>
+            <a:r>
+              <a:rPr lang="en-IN" dirty="0" err="1" smtClean="0">
+                <a:solidFill>
+                  <a:schemeClr val="bg2">
+                    <a:lumMod val="25000"/>
+                  </a:schemeClr>
+                </a:solidFill>
+              </a:rPr>
+              <a:t>Microservice</a:t>
+            </a:r>
+            <a:r>
+              <a:rPr lang="en-IN" dirty="0" smtClean="0">
+                <a:solidFill>
+                  <a:schemeClr val="bg2">
+                    <a:lumMod val="25000"/>
+                  </a:schemeClr>
+                </a:solidFill>
+              </a:rPr>
+              <a:t> and its Deployment</a:t>
+            </a:r>
+            <a:endParaRPr lang="en-IN" dirty="0">
+              <a:solidFill>
+                <a:schemeClr val="bg2">
+                  <a:lumMod val="25000"/>
+                </a:schemeClr>
+              </a:solidFill>
+            </a:endParaRPr>
+          </a:p>
+        </p:txBody>
+      </p:sp>
+    </p:spTree>
+    <p:extLst>
+      <p:ext uri="{BB962C8B-B14F-4D97-AF65-F5344CB8AC3E}">
+        <p14:creationId xmlns:p14="http://schemas.microsoft.com/office/powerpoint/2010/main" val="3773567671"/>
+      </p:ext>
+    </p:extLst>
+  </p:cSld>
+  <p:clrMapOvr>
+    <a:overrideClrMapping bg1="lt1" tx1="dk1" bg2="lt2" tx2="dk2" accent1="accent1" accent2="accent2" accent3="accent3" accent4="accent4" accent5="accent5" accent6="accent6" hlink="hlink" folHlink="folHlink"/>
+  </p:clrMapOvr>
+</p:sld>
+</file>
+
+<file path=ppt/slides/slide6.xml><?xml version="1.0" encoding="utf-8"?>
+<p:sld xmlns:a="http://schemas.openxmlformats.org/drawingml/2006/main" xmlns:r="http://schemas.openxmlformats.org/officeDocument/2006/relationships" xmlns:p="http://schemas.openxmlformats.org/presentationml/2006/main">
+  <p:cSld>
+    <p:bg>
+      <p:bgRef idx="1001">
+        <a:schemeClr val="bg1"/>
+      </p:bgRef>
+    </p:bg>
+    <p:spTree>
+      <p:nvGrpSpPr>
+        <p:cNvPr id="1" name=""/>
+        <p:cNvGrpSpPr/>
+        <p:nvPr/>
+      </p:nvGrpSpPr>
+      <p:grpSpPr>
+        <a:xfrm>
+          <a:off x="0" y="0"/>
+          <a:ext cx="0" cy="0"/>
+          <a:chOff x="0" y="0"/>
+          <a:chExt cx="0" cy="0"/>
+        </a:xfrm>
+      </p:grpSpPr>
+      <p:sp>
+        <p:nvSpPr>
+          <p:cNvPr id="3" name="Content Placeholder 2"/>
+          <p:cNvSpPr>
+            <a:spLocks noGrp="1"/>
+          </p:cNvSpPr>
+          <p:nvPr>
+            <p:ph idx="1"/>
+          </p:nvPr>
+        </p:nvSpPr>
+        <p:spPr>
+          <a:xfrm>
+            <a:off x="457200" y="1447800"/>
+            <a:ext cx="8229600" cy="4678363"/>
+          </a:xfrm>
+        </p:spPr>
+        <p:txBody>
+          <a:bodyPr/>
+          <a:lstStyle/>
+          <a:p>
+            <a:pPr marL="0" indent="0">
+              <a:buNone/>
+            </a:pPr>
+            <a:endParaRPr lang="en-IN" sz="1800" dirty="0"/>
+          </a:p>
+          <a:p>
+            <a:pPr marL="0" indent="0">
+              <a:buNone/>
+            </a:pPr>
+            <a:r>
+              <a:rPr lang="en-IN" sz="2000" b="1" dirty="0"/>
+              <a:t>Step </a:t>
+            </a:r>
+            <a:r>
+              <a:rPr lang="en-IN" sz="2000" b="1" dirty="0" smtClean="0"/>
+              <a:t>4: Create </a:t>
+            </a:r>
+            <a:r>
+              <a:rPr lang="en-IN" sz="2000" b="1" dirty="0" err="1" smtClean="0"/>
+              <a:t>NodePort</a:t>
+            </a:r>
+            <a:r>
+              <a:rPr lang="en-IN" sz="2000" b="1" dirty="0" smtClean="0"/>
+              <a:t> Service to access Pods running inside the cluster</a:t>
+            </a:r>
+          </a:p>
+          <a:p>
+            <a:pPr marL="0" indent="0">
+              <a:buNone/>
+            </a:pPr>
+            <a:endParaRPr lang="en-IN" sz="2000" b="1" dirty="0" smtClean="0"/>
+          </a:p>
+          <a:p>
+            <a:pPr marL="0" indent="0">
+              <a:buNone/>
+            </a:pPr>
+            <a:r>
+              <a:rPr lang="en-IN" sz="1200" dirty="0" smtClean="0"/>
+              <a:t>2) Create </a:t>
+            </a:r>
+            <a:r>
+              <a:rPr lang="en-IN" sz="1200" b="1" dirty="0" err="1" smtClean="0"/>
+              <a:t>NodePort</a:t>
+            </a:r>
+            <a:r>
+              <a:rPr lang="en-IN" sz="1200" b="1" dirty="0" smtClean="0"/>
+              <a:t> </a:t>
+            </a:r>
+            <a:r>
+              <a:rPr lang="en-IN" sz="1200" dirty="0" smtClean="0"/>
+              <a:t>service to access pods running in platform service.</a:t>
+            </a:r>
+          </a:p>
+          <a:p>
+            <a:pPr marL="0" indent="0">
+              <a:buNone/>
+            </a:pPr>
+            <a:endParaRPr lang="en-IN" sz="1200" dirty="0" smtClean="0"/>
+          </a:p>
+          <a:p>
+            <a:pPr marL="0" indent="0">
+              <a:buNone/>
+            </a:pPr>
+            <a:endParaRPr lang="en-IN" sz="1200" dirty="0"/>
+          </a:p>
+          <a:p>
+            <a:pPr marL="0" indent="0">
+              <a:buNone/>
+            </a:pPr>
+            <a:endParaRPr lang="en-IN" sz="1200" dirty="0" smtClean="0"/>
+          </a:p>
+          <a:p>
+            <a:pPr marL="0" indent="0">
+              <a:buNone/>
+            </a:pPr>
+            <a:endParaRPr lang="en-IN" sz="1200" dirty="0"/>
+          </a:p>
+          <a:p>
+            <a:pPr marL="0" indent="0">
+              <a:buNone/>
+            </a:pPr>
+            <a:endParaRPr lang="en-IN" sz="1200" dirty="0" smtClean="0"/>
+          </a:p>
+          <a:p>
+            <a:pPr marL="0" indent="0">
+              <a:buNone/>
+            </a:pPr>
+            <a:endParaRPr lang="en-IN" sz="1200" dirty="0"/>
+          </a:p>
+          <a:p>
+            <a:pPr marL="0" indent="0">
+              <a:buNone/>
+            </a:pPr>
+            <a:endParaRPr lang="en-IN" sz="1200" dirty="0" smtClean="0"/>
+          </a:p>
+          <a:p>
+            <a:pPr marL="0" indent="0">
+              <a:buNone/>
+            </a:pPr>
+            <a:endParaRPr lang="en-IN" sz="1200" dirty="0"/>
+          </a:p>
+          <a:p>
+            <a:pPr marL="0" indent="0">
+              <a:buNone/>
+            </a:pPr>
+            <a:endParaRPr lang="en-IN" sz="1200" dirty="0" smtClean="0"/>
+          </a:p>
+          <a:p>
+            <a:pPr marL="0" indent="0">
+              <a:buNone/>
+            </a:pPr>
+            <a:endParaRPr lang="en-IN" sz="1200" dirty="0"/>
+          </a:p>
+          <a:p>
+            <a:pPr marL="0" indent="0">
+              <a:buNone/>
+            </a:pPr>
+            <a:endParaRPr lang="en-IN" sz="1200" dirty="0" smtClean="0"/>
+          </a:p>
+          <a:p>
+            <a:pPr marL="0" indent="0">
+              <a:buNone/>
+            </a:pPr>
+            <a:endParaRPr lang="en-IN" sz="1200" dirty="0"/>
+          </a:p>
+          <a:p>
+            <a:pPr marL="0" indent="0">
+              <a:buNone/>
+            </a:pPr>
+            <a:endParaRPr lang="en-IN" sz="1200" dirty="0" smtClean="0"/>
+          </a:p>
+          <a:p>
+            <a:pPr marL="0" indent="0">
+              <a:buNone/>
+            </a:pPr>
+            <a:endParaRPr lang="en-IN" sz="1200" dirty="0"/>
+          </a:p>
+          <a:p>
+            <a:pPr marL="0" indent="0">
+              <a:buNone/>
+            </a:pPr>
+            <a:endParaRPr lang="en-IN" sz="1200" dirty="0" smtClean="0"/>
+          </a:p>
+          <a:p>
+            <a:pPr marL="0" indent="0">
+              <a:buNone/>
+            </a:pPr>
+            <a:endParaRPr lang="en-IN" sz="1200" dirty="0"/>
+          </a:p>
+          <a:p>
+            <a:pPr marL="0" indent="0">
+              <a:buNone/>
+            </a:pPr>
+            <a:endParaRPr lang="en-IN" sz="1200" dirty="0" smtClean="0"/>
+          </a:p>
+          <a:p>
+            <a:pPr marL="0" indent="0">
+              <a:buNone/>
+            </a:pPr>
+            <a:endParaRPr lang="en-IN" sz="1200" dirty="0"/>
+          </a:p>
+          <a:p>
+            <a:pPr marL="0" indent="0">
+              <a:buNone/>
+            </a:pPr>
+            <a:endParaRPr lang="en-IN" sz="1200" dirty="0" smtClean="0"/>
+          </a:p>
+          <a:p>
+            <a:pPr marL="0" indent="0">
+              <a:buNone/>
+            </a:pPr>
+            <a:endParaRPr lang="en-IN" sz="1200" dirty="0"/>
+          </a:p>
+          <a:p>
+            <a:pPr marL="0" indent="0">
+              <a:buNone/>
+            </a:pPr>
+            <a:endParaRPr lang="en-IN" sz="1200" dirty="0" smtClean="0"/>
+          </a:p>
+          <a:p>
+            <a:pPr marL="0" indent="0">
+              <a:buNone/>
+            </a:pPr>
+            <a:endParaRPr lang="en-IN" sz="1200" dirty="0"/>
+          </a:p>
+          <a:p>
+            <a:pPr marL="0" indent="0">
+              <a:buNone/>
+            </a:pPr>
+            <a:endParaRPr lang="en-IN" sz="1200" dirty="0" smtClean="0"/>
+          </a:p>
+          <a:p>
+            <a:pPr marL="0" indent="0">
+              <a:buNone/>
+            </a:pPr>
+            <a:endParaRPr lang="en-IN" sz="1200" dirty="0"/>
+          </a:p>
+          <a:p>
+            <a:pPr marL="0" indent="0">
+              <a:buNone/>
+            </a:pPr>
+            <a:endParaRPr lang="en-IN" sz="1200" dirty="0" smtClean="0"/>
+          </a:p>
+          <a:p>
+            <a:pPr marL="0" indent="0">
+              <a:buNone/>
+            </a:pPr>
+            <a:endParaRPr lang="en-IN" sz="1200" dirty="0"/>
+          </a:p>
+          <a:p>
+            <a:pPr marL="0" indent="0">
+              <a:buNone/>
+            </a:pPr>
+            <a:endParaRPr lang="en-IN" sz="1200" dirty="0" smtClean="0"/>
+          </a:p>
+          <a:p>
+            <a:pPr marL="0" indent="0">
+              <a:buNone/>
+            </a:pPr>
+            <a:endParaRPr lang="en-IN" sz="1200" dirty="0"/>
+          </a:p>
+          <a:p>
+            <a:pPr marL="0" indent="0">
+              <a:buNone/>
+            </a:pPr>
+            <a:endParaRPr lang="en-IN" sz="1200" dirty="0" smtClean="0"/>
+          </a:p>
+          <a:p>
+            <a:pPr marL="0" indent="0">
+              <a:buNone/>
+            </a:pPr>
+            <a:endParaRPr lang="en-IN" sz="1200" dirty="0"/>
+          </a:p>
+        </p:txBody>
+      </p:sp>
+      <p:pic>
+        <p:nvPicPr>
+          <p:cNvPr id="2050" name="Picture 2"/>
+          <p:cNvPicPr>
+            <a:picLocks noChangeAspect="1" noChangeArrowheads="1"/>
+          </p:cNvPicPr>
+          <p:nvPr/>
+        </p:nvPicPr>
+        <p:blipFill>
+          <a:blip r:embed="rId3" cstate="print">
+            <a:extLst>
+              <a:ext uri="{28A0092B-C50C-407E-A947-70E740481C1C}">
+                <a14:useLocalDpi xmlns:a14="http://schemas.microsoft.com/office/drawing/2010/main" val="0"/>
+              </a:ext>
+            </a:extLst>
+          </a:blip>
+          <a:srcRect/>
+          <a:stretch>
+            <a:fillRect/>
+          </a:stretch>
+        </p:blipFill>
+        <p:spPr bwMode="auto">
+          <a:xfrm>
+            <a:off x="878280" y="2819400"/>
+            <a:ext cx="2800350" cy="2598737"/>
+          </a:xfrm>
+          <a:prstGeom prst="rect">
+            <a:avLst/>
+          </a:prstGeom>
+          <a:noFill/>
+          <a:ln>
+            <a:noFill/>
+          </a:ln>
+          <a:effectLst/>
+          <a:extLst>
+            <a:ext uri="{909E8E84-426E-40DD-AFC4-6F175D3DCCD1}">
+              <a14:hiddenFill xmlns:a14="http://schemas.microsoft.com/office/drawing/2010/main">
+                <a:solidFill>
+                  <a:schemeClr val="accent1"/>
+                </a:solidFill>
+              </a14:hiddenFill>
+            </a:ext>
+            <a:ext uri="{91240B29-F687-4F45-9708-019B960494DF}">
+              <a14:hiddenLine xmlns:a14="http://schemas.microsoft.com/office/drawing/2010/main" w="9525">
+                <a:solidFill>
+                  <a:schemeClr val="tx1"/>
+                </a:solidFill>
+                <a:miter lim="800000"/>
+                <a:headEnd/>
+                <a:tailEnd/>
+              </a14:hiddenLine>
+            </a:ext>
+            <a:ext uri="{AF507438-7753-43E0-B8FC-AC1667EBCBE1}">
+              <a14:hiddenEffects xmlns:a14="http://schemas.microsoft.com/office/drawing/2010/main">
+                <a:effectLst>
+                  <a:outerShdw dist="35921" dir="2700000" algn="ctr" rotWithShape="0">
+                    <a:schemeClr val="bg2"/>
+                  </a:outerShdw>
+                </a:effectLst>
+              </a14:hiddenEffects>
+            </a:ext>
+          </a:extLst>
+        </p:spPr>
+      </p:pic>
+      <p:pic>
+        <p:nvPicPr>
+          <p:cNvPr id="2051" name="Picture 3"/>
+          <p:cNvPicPr>
+            <a:picLocks noChangeAspect="1" noChangeArrowheads="1"/>
+          </p:cNvPicPr>
+          <p:nvPr/>
+        </p:nvPicPr>
+        <p:blipFill>
+          <a:blip r:embed="rId4" cstate="print">
+            <a:extLst>
+              <a:ext uri="{28A0092B-C50C-407E-A947-70E740481C1C}">
+                <a14:useLocalDpi xmlns:a14="http://schemas.microsoft.com/office/drawing/2010/main" val="0"/>
+              </a:ext>
+            </a:extLst>
+          </a:blip>
+          <a:srcRect/>
+          <a:stretch>
+            <a:fillRect/>
+          </a:stretch>
+        </p:blipFill>
+        <p:spPr bwMode="auto">
+          <a:xfrm>
+            <a:off x="878280" y="5630863"/>
+            <a:ext cx="6153150" cy="312737"/>
+          </a:xfrm>
+          <a:prstGeom prst="rect">
+            <a:avLst/>
+          </a:prstGeom>
+          <a:noFill/>
+          <a:ln>
+            <a:noFill/>
+          </a:ln>
+          <a:effectLst/>
+          <a:extLst>
+            <a:ext uri="{909E8E84-426E-40DD-AFC4-6F175D3DCCD1}">
+              <a14:hiddenFill xmlns:a14="http://schemas.microsoft.com/office/drawing/2010/main">
+                <a:solidFill>
+                  <a:schemeClr val="accent1"/>
+                </a:solidFill>
+              </a14:hiddenFill>
+            </a:ext>
+            <a:ext uri="{91240B29-F687-4F45-9708-019B960494DF}">
+              <a14:hiddenLine xmlns:a14="http://schemas.microsoft.com/office/drawing/2010/main" w="9525">
+                <a:solidFill>
+                  <a:schemeClr val="tx1"/>
+                </a:solidFill>
+                <a:miter lim="800000"/>
+                <a:headEnd/>
+                <a:tailEnd/>
+              </a14:hiddenLine>
+            </a:ext>
+            <a:ext uri="{AF507438-7753-43E0-B8FC-AC1667EBCBE1}">
+              <a14:hiddenEffects xmlns:a14="http://schemas.microsoft.com/office/drawing/2010/main">
+                <a:effectLst>
+                  <a:outerShdw dist="35921" dir="2700000" algn="ctr" rotWithShape="0">
+                    <a:schemeClr val="bg2"/>
+                  </a:outerShdw>
+                </a:effectLst>
+              </a14:hiddenEffects>
+            </a:ext>
+          </a:extLst>
+        </p:spPr>
+      </p:pic>
+      <p:sp>
+        <p:nvSpPr>
+          <p:cNvPr id="6" name="Title 1"/>
+          <p:cNvSpPr>
+            <a:spLocks noGrp="1"/>
+          </p:cNvSpPr>
+          <p:nvPr>
+            <p:ph type="title"/>
+          </p:nvPr>
+        </p:nvSpPr>
+        <p:spPr>
+          <a:xfrm>
+            <a:off x="457200" y="274638"/>
+            <a:ext cx="8229600" cy="1143000"/>
+          </a:xfrm>
+        </p:spPr>
+        <p:txBody>
+          <a:bodyPr>
+            <a:normAutofit fontScale="90000"/>
+          </a:bodyPr>
+          <a:lstStyle/>
+          <a:p>
+            <a:r>
+              <a:rPr lang="en-IN" dirty="0" smtClean="0">
+                <a:solidFill>
+                  <a:schemeClr val="bg2">
+                    <a:lumMod val="25000"/>
+                  </a:schemeClr>
+                </a:solidFill>
+              </a:rPr>
+              <a:t>STAGE 1 : First </a:t>
+            </a:r>
+            <a:r>
+              <a:rPr lang="en-IN" dirty="0" err="1" smtClean="0">
+                <a:solidFill>
+                  <a:schemeClr val="bg2">
+                    <a:lumMod val="25000"/>
+                  </a:schemeClr>
+                </a:solidFill>
+              </a:rPr>
+              <a:t>Microservice</a:t>
+            </a:r>
+            <a:r>
+              <a:rPr lang="en-IN" dirty="0" smtClean="0">
+                <a:solidFill>
+                  <a:schemeClr val="bg2">
+                    <a:lumMod val="25000"/>
+                  </a:schemeClr>
+                </a:solidFill>
+              </a:rPr>
+              <a:t> and its Deployment</a:t>
+            </a:r>
+            <a:endParaRPr lang="en-IN" dirty="0">
+              <a:solidFill>
+                <a:schemeClr val="bg2">
+                  <a:lumMod val="25000"/>
+                </a:schemeClr>
+              </a:solidFill>
+            </a:endParaRPr>
+          </a:p>
+        </p:txBody>
+      </p:sp>
+    </p:spTree>
+    <p:extLst>
+      <p:ext uri="{BB962C8B-B14F-4D97-AF65-F5344CB8AC3E}">
+        <p14:creationId xmlns:p14="http://schemas.microsoft.com/office/powerpoint/2010/main" val="3649901215"/>
+      </p:ext>
+    </p:extLst>
+  </p:cSld>
+  <p:clrMapOvr>
+    <a:overrideClrMapping bg1="lt1" tx1="dk1" bg2="lt2" tx2="dk2" accent1="accent1" accent2="accent2" accent3="accent3" accent4="accent4" accent5="accent5" accent6="accent6" hlink="hlink" folHlink="folHlink"/>
+  </p:clrMapOvr>
+</p:sld>
+</file>
+
+<file path=ppt/slides/slide7.xml><?xml version="1.0" encoding="utf-8"?>
+<p:sld xmlns:a="http://schemas.openxmlformats.org/drawingml/2006/main" xmlns:r="http://schemas.openxmlformats.org/officeDocument/2006/relationships" xmlns:p="http://schemas.openxmlformats.org/presentationml/2006/main">
+  <p:cSld>
+    <p:bg>
+      <p:bgRef idx="1001">
+        <a:schemeClr val="bg1"/>
+      </p:bgRef>
+    </p:bg>
+    <p:spTree>
+      <p:nvGrpSpPr>
+        <p:cNvPr id="1" name=""/>
+        <p:cNvGrpSpPr/>
+        <p:nvPr/>
+      </p:nvGrpSpPr>
+      <p:grpSpPr>
+        <a:xfrm>
+          <a:off x="0" y="0"/>
+          <a:ext cx="0" cy="0"/>
+          <a:chOff x="0" y="0"/>
+          <a:chExt cx="0" cy="0"/>
+        </a:xfrm>
+      </p:grpSpPr>
+      <p:sp>
+        <p:nvSpPr>
+          <p:cNvPr id="11" name="Title 1"/>
+          <p:cNvSpPr>
+            <a:spLocks noGrp="1"/>
+          </p:cNvSpPr>
+          <p:nvPr>
+            <p:ph type="title"/>
+          </p:nvPr>
+        </p:nvSpPr>
+        <p:spPr/>
+        <p:txBody>
+          <a:bodyPr>
+            <a:normAutofit fontScale="90000"/>
+          </a:bodyPr>
+          <a:lstStyle/>
+          <a:p>
+            <a:r>
+              <a:rPr lang="en-IN" dirty="0">
+                <a:solidFill>
+                  <a:schemeClr val="bg2">
+                    <a:lumMod val="25000"/>
+                  </a:schemeClr>
+                </a:solidFill>
+              </a:rPr>
+              <a:t>STAGE </a:t>
+            </a:r>
+            <a:r>
+              <a:rPr lang="en-IN" dirty="0" smtClean="0">
+                <a:solidFill>
+                  <a:schemeClr val="bg2">
+                    <a:lumMod val="25000"/>
+                  </a:schemeClr>
+                </a:solidFill>
+              </a:rPr>
+              <a:t>2 </a:t>
+            </a:r>
+            <a:r>
+              <a:rPr lang="en-IN" dirty="0">
+                <a:solidFill>
+                  <a:schemeClr val="bg2">
+                    <a:lumMod val="25000"/>
+                  </a:schemeClr>
+                </a:solidFill>
+              </a:rPr>
+              <a:t>: </a:t>
+            </a:r>
+            <a:r>
+              <a:rPr lang="en-IN" dirty="0" smtClean="0">
+                <a:solidFill>
+                  <a:schemeClr val="bg2">
+                    <a:lumMod val="25000"/>
+                  </a:schemeClr>
+                </a:solidFill>
+              </a:rPr>
+              <a:t>Second </a:t>
+            </a:r>
+            <a:r>
+              <a:rPr lang="en-IN" dirty="0" err="1">
+                <a:solidFill>
+                  <a:schemeClr val="bg2">
+                    <a:lumMod val="25000"/>
+                  </a:schemeClr>
+                </a:solidFill>
+              </a:rPr>
+              <a:t>Microservice</a:t>
+            </a:r>
+            <a:r>
+              <a:rPr lang="en-IN" dirty="0">
+                <a:solidFill>
+                  <a:schemeClr val="bg2">
+                    <a:lumMod val="25000"/>
+                  </a:schemeClr>
+                </a:solidFill>
+              </a:rPr>
+              <a:t> and its Deployment</a:t>
+            </a:r>
+            <a:endParaRPr lang="en-IN" dirty="0"/>
+          </a:p>
+        </p:txBody>
+      </p:sp>
+      <p:sp>
+        <p:nvSpPr>
+          <p:cNvPr id="12" name="Content Placeholder 2"/>
+          <p:cNvSpPr>
+            <a:spLocks noGrp="1"/>
+          </p:cNvSpPr>
+          <p:nvPr>
+            <p:ph idx="1"/>
+          </p:nvPr>
+        </p:nvSpPr>
+        <p:spPr/>
+        <p:txBody>
+          <a:bodyPr>
+            <a:normAutofit/>
+          </a:bodyPr>
+          <a:lstStyle/>
+          <a:p>
+            <a:pPr marL="0" indent="0">
+              <a:buNone/>
+            </a:pPr>
+            <a:r>
+              <a:rPr lang="en-IN" sz="2400" dirty="0" smtClean="0"/>
+              <a:t>GOAL : Write Second </a:t>
+            </a:r>
+            <a:r>
+              <a:rPr lang="en-IN" sz="2400" dirty="0" err="1" smtClean="0"/>
+              <a:t>Microservice</a:t>
+            </a:r>
+            <a:r>
+              <a:rPr lang="en-IN" sz="2400" dirty="0" smtClean="0"/>
+              <a:t> and Run inside a K8s cluster.</a:t>
+            </a:r>
+          </a:p>
+          <a:p>
+            <a:pPr marL="0" indent="0">
+              <a:buNone/>
+            </a:pPr>
+            <a:endParaRPr lang="en-IN" sz="2400" dirty="0" smtClean="0"/>
+          </a:p>
+          <a:p>
+            <a:pPr marL="400050" lvl="1" indent="0">
+              <a:buNone/>
+            </a:pPr>
+            <a:r>
+              <a:rPr lang="en-IN" sz="2100" dirty="0"/>
+              <a:t>Step 1:</a:t>
+            </a:r>
+          </a:p>
+          <a:p>
+            <a:pPr marL="400050" lvl="1" indent="0">
+              <a:buNone/>
+            </a:pPr>
+            <a:r>
+              <a:rPr lang="en-IN" sz="2000" dirty="0"/>
+              <a:t>	</a:t>
+            </a:r>
+            <a:r>
+              <a:rPr lang="en-IN" sz="2000" dirty="0" smtClean="0"/>
+              <a:t> Create a REST Web API project – Command Service. </a:t>
+            </a:r>
+          </a:p>
+          <a:p>
+            <a:pPr marL="400050" lvl="1" indent="0">
+              <a:buNone/>
+            </a:pPr>
+            <a:endParaRPr lang="en-IN" sz="2000" dirty="0" smtClean="0"/>
+          </a:p>
+          <a:p>
+            <a:pPr marL="400050" lvl="1" indent="0">
+              <a:buNone/>
+            </a:pPr>
+            <a:r>
+              <a:rPr lang="en-IN" sz="2000" dirty="0" smtClean="0"/>
+              <a:t>Step 2:</a:t>
+            </a:r>
+          </a:p>
+          <a:p>
+            <a:pPr marL="400050" lvl="1" indent="0">
+              <a:buNone/>
+            </a:pPr>
+            <a:r>
+              <a:rPr lang="en-IN" sz="2000" dirty="0"/>
+              <a:t>	</a:t>
+            </a:r>
+            <a:r>
+              <a:rPr lang="en-IN" sz="2000" dirty="0" smtClean="0"/>
+              <a:t> Create </a:t>
+            </a:r>
+            <a:r>
+              <a:rPr lang="en-IN" sz="2000" dirty="0" err="1" smtClean="0"/>
+              <a:t>Docker</a:t>
+            </a:r>
+            <a:r>
+              <a:rPr lang="en-IN" sz="2000" dirty="0" smtClean="0"/>
+              <a:t> Image and Push it to </a:t>
+            </a:r>
+            <a:r>
+              <a:rPr lang="en-IN" sz="2000" dirty="0" err="1" smtClean="0"/>
+              <a:t>Docker</a:t>
+            </a:r>
+            <a:r>
+              <a:rPr lang="en-IN" sz="2000" dirty="0" smtClean="0"/>
+              <a:t> hub.</a:t>
+            </a:r>
+          </a:p>
+          <a:p>
+            <a:pPr marL="400050" lvl="1" indent="0">
+              <a:buNone/>
+            </a:pPr>
+            <a:endParaRPr lang="en-IN" sz="2000" dirty="0" smtClean="0"/>
+          </a:p>
+          <a:p>
+            <a:pPr marL="400050" lvl="1" indent="0">
+              <a:buNone/>
+            </a:pPr>
+            <a:r>
+              <a:rPr lang="en-IN" sz="2000" dirty="0" smtClean="0"/>
+              <a:t>Step 3:</a:t>
+            </a:r>
+          </a:p>
+          <a:p>
+            <a:pPr marL="400050" lvl="1" indent="0">
+              <a:buNone/>
+            </a:pPr>
+            <a:r>
+              <a:rPr lang="en-IN" sz="2000" dirty="0"/>
+              <a:t>	</a:t>
+            </a:r>
+            <a:r>
+              <a:rPr lang="en-IN" sz="2000" dirty="0" smtClean="0"/>
+              <a:t> Create Deployment file to run </a:t>
+            </a:r>
+            <a:r>
+              <a:rPr lang="en-IN" sz="2000" dirty="0" err="1" smtClean="0"/>
+              <a:t>microservice</a:t>
+            </a:r>
+            <a:r>
+              <a:rPr lang="en-IN" sz="2000" dirty="0" smtClean="0"/>
+              <a:t> as Pods inside K8s environment.</a:t>
+            </a:r>
+          </a:p>
+          <a:p>
+            <a:pPr marL="400050" lvl="1" indent="0">
+              <a:buNone/>
+            </a:pPr>
+            <a:endParaRPr lang="en-IN" sz="2000" dirty="0"/>
+          </a:p>
+        </p:txBody>
+      </p:sp>
+    </p:spTree>
+    <p:extLst>
+      <p:ext uri="{BB962C8B-B14F-4D97-AF65-F5344CB8AC3E}">
+        <p14:creationId xmlns:p14="http://schemas.microsoft.com/office/powerpoint/2010/main" val="2006115113"/>
+      </p:ext>
+    </p:extLst>
+  </p:cSld>
+  <p:clrMapOvr>
+    <a:overrideClrMapping bg1="lt1" tx1="dk1" bg2="lt2" tx2="dk2" accent1="accent1" accent2="accent2" accent3="accent3" accent4="accent4" accent5="accent5" accent6="accent6" hlink="hlink" folHlink="folHlink"/>
+  </p:clrMapOvr>
+</p:sld>
+</file>
+
+<file path=ppt/slides/slide8.xml><?xml version="1.0" encoding="utf-8"?>
+<p:sld xmlns:a="http://schemas.openxmlformats.org/drawingml/2006/main" xmlns:r="http://schemas.openxmlformats.org/officeDocument/2006/relationships" xmlns:p="http://schemas.openxmlformats.org/presentationml/2006/main">
+  <p:cSld>
+    <p:bg>
+      <p:bgRef idx="1001">
+        <a:schemeClr val="bg1"/>
+      </p:bgRef>
+    </p:bg>
+    <p:spTree>
+      <p:nvGrpSpPr>
+        <p:cNvPr id="1" name=""/>
+        <p:cNvGrpSpPr/>
+        <p:nvPr/>
+      </p:nvGrpSpPr>
+      <p:grpSpPr>
+        <a:xfrm>
+          <a:off x="0" y="0"/>
+          <a:ext cx="0" cy="0"/>
+          <a:chOff x="0" y="0"/>
+          <a:chExt cx="0" cy="0"/>
+        </a:xfrm>
+      </p:grpSpPr>
+      <p:sp>
+        <p:nvSpPr>
+          <p:cNvPr id="3" name="Content Placeholder 2"/>
+          <p:cNvSpPr>
+            <a:spLocks noGrp="1"/>
+          </p:cNvSpPr>
+          <p:nvPr>
+            <p:ph idx="1"/>
+          </p:nvPr>
+        </p:nvSpPr>
+        <p:spPr>
+          <a:xfrm>
+            <a:off x="457200" y="685800"/>
+            <a:ext cx="8229600" cy="5440363"/>
+          </a:xfrm>
+        </p:spPr>
+        <p:txBody>
+          <a:bodyPr>
+            <a:normAutofit/>
+          </a:bodyPr>
+          <a:lstStyle/>
+          <a:p>
+            <a:pPr marL="0" indent="0">
+              <a:buNone/>
+            </a:pPr>
+            <a:r>
+              <a:rPr lang="en-IN" sz="2400" dirty="0" smtClean="0"/>
+              <a:t>Command </a:t>
+            </a:r>
+            <a:r>
+              <a:rPr lang="en-IN" sz="2400" dirty="0"/>
+              <a:t>Service deployment File.</a:t>
+            </a:r>
+            <a:endParaRPr lang="en-IN" sz="2400" dirty="0"/>
+          </a:p>
+        </p:txBody>
+      </p:sp>
+      <p:pic>
+        <p:nvPicPr>
+          <p:cNvPr id="3074" name="Picture 2"/>
+          <p:cNvPicPr>
+            <a:picLocks noChangeAspect="1" noChangeArrowheads="1"/>
+          </p:cNvPicPr>
+          <p:nvPr/>
+        </p:nvPicPr>
+        <p:blipFill>
+          <a:blip r:embed="rId3" cstate="print">
+            <a:extLst>
+              <a:ext uri="{28A0092B-C50C-407E-A947-70E740481C1C}">
+                <a14:useLocalDpi xmlns:a14="http://schemas.microsoft.com/office/drawing/2010/main" val="0"/>
+              </a:ext>
+            </a:extLst>
+          </a:blip>
+          <a:srcRect/>
+          <a:stretch>
+            <a:fillRect/>
+          </a:stretch>
+        </p:blipFill>
+        <p:spPr bwMode="auto">
+          <a:xfrm>
+            <a:off x="609600" y="1371600"/>
+            <a:ext cx="4210050" cy="3151187"/>
+          </a:xfrm>
+          <a:prstGeom prst="rect">
+            <a:avLst/>
+          </a:prstGeom>
+          <a:noFill/>
+          <a:ln>
+            <a:noFill/>
+          </a:ln>
+          <a:effectLst/>
+          <a:extLst>
+            <a:ext uri="{909E8E84-426E-40DD-AFC4-6F175D3DCCD1}">
+              <a14:hiddenFill xmlns:a14="http://schemas.microsoft.com/office/drawing/2010/main">
+                <a:solidFill>
+                  <a:schemeClr val="accent1"/>
+                </a:solidFill>
+              </a14:hiddenFill>
+            </a:ext>
+            <a:ext uri="{91240B29-F687-4F45-9708-019B960494DF}">
+              <a14:hiddenLine xmlns:a14="http://schemas.microsoft.com/office/drawing/2010/main" w="9525">
+                <a:solidFill>
+                  <a:schemeClr val="tx1"/>
+                </a:solidFill>
+                <a:miter lim="800000"/>
+                <a:headEnd/>
+                <a:tailEnd/>
+              </a14:hiddenLine>
+            </a:ext>
+            <a:ext uri="{AF507438-7753-43E0-B8FC-AC1667EBCBE1}">
+              <a14:hiddenEffects xmlns:a14="http://schemas.microsoft.com/office/drawing/2010/main">
+                <a:effectLst>
+                  <a:outerShdw dist="35921" dir="2700000" algn="ctr" rotWithShape="0">
+                    <a:schemeClr val="bg2"/>
+                  </a:outerShdw>
+                </a:effectLst>
+              </a14:hiddenEffects>
+            </a:ext>
+          </a:extLst>
+        </p:spPr>
+      </p:pic>
+    </p:spTree>
+    <p:extLst>
+      <p:ext uri="{BB962C8B-B14F-4D97-AF65-F5344CB8AC3E}">
+        <p14:creationId xmlns:p14="http://schemas.microsoft.com/office/powerpoint/2010/main" val="3763726810"/>
+      </p:ext>
+    </p:extLst>
+  </p:cSld>
+  <p:clrMapOvr>
+    <a:overrideClrMapping bg1="lt1" tx1="dk1" bg2="lt2" tx2="dk2" accent1="accent1" accent2="accent2" accent3="accent3" accent4="accent4" accent5="accent5" accent6="accent6" hlink="hlink" folHlink="folHlink"/>
+  </p:clrMapOvr>
+</p:sld>
+</file>
+
+<file path=ppt/slides/slide9.xml><?xml version="1.0" encoding="utf-8"?>
+<p:sld xmlns:a="http://schemas.openxmlformats.org/drawingml/2006/main" xmlns:r="http://schemas.openxmlformats.org/officeDocument/2006/relationships" xmlns:p="http://schemas.openxmlformats.org/presentationml/2006/main">
+  <p:cSld>
+    <p:spTree>
+      <p:nvGrpSpPr>
+        <p:cNvPr id="1" name=""/>
+        <p:cNvGrpSpPr/>
+        <p:nvPr/>
+      </p:nvGrpSpPr>
+      <p:grpSpPr>
+        <a:xfrm>
+          <a:off x="0" y="0"/>
+          <a:ext cx="0" cy="0"/>
+          <a:chOff x="0" y="0"/>
+          <a:chExt cx="0" cy="0"/>
+        </a:xfrm>
+      </p:grpSpPr>
+      <p:sp>
+        <p:nvSpPr>
+          <p:cNvPr id="2" name="Title 1"/>
+          <p:cNvSpPr>
+            <a:spLocks noGrp="1"/>
+          </p:cNvSpPr>
+          <p:nvPr>
+            <p:ph type="title"/>
+          </p:nvPr>
+        </p:nvSpPr>
+        <p:spPr/>
+        <p:txBody>
+          <a:bodyPr>
+            <a:normAutofit fontScale="90000"/>
+          </a:bodyPr>
+          <a:lstStyle/>
+          <a:p>
+            <a:r>
+              <a:rPr lang="en-IN" sz="4000" dirty="0" smtClean="0">
+                <a:solidFill>
+                  <a:schemeClr val="bg2">
+                    <a:lumMod val="25000"/>
+                  </a:schemeClr>
+                </a:solidFill>
+              </a:rPr>
+              <a:t>STAGE 3: </a:t>
+            </a:r>
+            <a:r>
+              <a:rPr lang="en-IN" sz="4000" dirty="0" err="1" smtClean="0">
+                <a:solidFill>
+                  <a:schemeClr val="bg2">
+                    <a:lumMod val="25000"/>
+                  </a:schemeClr>
+                </a:solidFill>
+              </a:rPr>
+              <a:t>Microservice</a:t>
+            </a:r>
+            <a:r>
+              <a:rPr lang="en-IN" sz="4000" dirty="0" smtClean="0">
+                <a:solidFill>
+                  <a:schemeClr val="bg2">
+                    <a:lumMod val="25000"/>
+                  </a:schemeClr>
+                </a:solidFill>
+              </a:rPr>
+              <a:t>-to-</a:t>
+            </a:r>
+            <a:r>
+              <a:rPr lang="en-IN" sz="4000" dirty="0" err="1" smtClean="0">
+                <a:solidFill>
+                  <a:schemeClr val="bg2">
+                    <a:lumMod val="25000"/>
+                  </a:schemeClr>
+                </a:solidFill>
+              </a:rPr>
+              <a:t>Microservice</a:t>
+            </a:r>
+            <a:r>
+              <a:rPr lang="en-IN" sz="4000" dirty="0" smtClean="0">
+                <a:solidFill>
+                  <a:schemeClr val="bg2">
+                    <a:lumMod val="25000"/>
+                  </a:schemeClr>
+                </a:solidFill>
+              </a:rPr>
+              <a:t> Synchronous Communication</a:t>
+            </a:r>
+            <a:endParaRPr lang="en-IN" sz="4000" dirty="0">
+              <a:solidFill>
+                <a:schemeClr val="bg2">
+                  <a:lumMod val="25000"/>
+                </a:schemeClr>
+              </a:solidFill>
+            </a:endParaRPr>
+          </a:p>
+        </p:txBody>
+      </p:sp>
+      <p:sp>
+        <p:nvSpPr>
+          <p:cNvPr id="3" name="Content Placeholder 2"/>
+          <p:cNvSpPr>
+            <a:spLocks noGrp="1"/>
+          </p:cNvSpPr>
+          <p:nvPr>
+            <p:ph idx="1"/>
+          </p:nvPr>
+        </p:nvSpPr>
+        <p:spPr/>
+        <p:txBody>
+          <a:bodyPr>
+            <a:normAutofit/>
+          </a:bodyPr>
+          <a:lstStyle/>
+          <a:p>
+            <a:pPr marL="0" indent="0">
+              <a:buNone/>
+            </a:pPr>
+            <a:r>
+              <a:rPr lang="en-IN" sz="2000" dirty="0"/>
+              <a:t>GOAL: Create a </a:t>
+            </a:r>
+            <a:r>
+              <a:rPr lang="en-IN" sz="2000" dirty="0" err="1"/>
+              <a:t>ClusterIP</a:t>
+            </a:r>
+            <a:r>
+              <a:rPr lang="en-IN" sz="2000" dirty="0"/>
+              <a:t> service for Platform and Command </a:t>
+            </a:r>
+            <a:r>
+              <a:rPr lang="en-IN" sz="2000" dirty="0" err="1"/>
+              <a:t>microservice</a:t>
+            </a:r>
+            <a:r>
+              <a:rPr lang="en-IN" sz="2000" dirty="0"/>
+              <a:t> to allow both to communicate with each other within the cluster.</a:t>
+            </a:r>
+          </a:p>
+          <a:p>
+            <a:pPr marL="0" indent="0">
+              <a:buNone/>
+            </a:pPr>
+            <a:endParaRPr lang="en-IN" sz="2000" dirty="0"/>
+          </a:p>
+          <a:p>
+            <a:pPr marL="0" indent="0">
+              <a:buNone/>
+            </a:pPr>
+            <a:r>
+              <a:rPr lang="en-IN" sz="2000" dirty="0"/>
+              <a:t>Step 1: </a:t>
+            </a:r>
+            <a:endParaRPr lang="en-IN" sz="2000" dirty="0" smtClean="0"/>
+          </a:p>
+          <a:p>
+            <a:pPr marL="0" indent="0">
+              <a:buNone/>
+            </a:pPr>
+            <a:r>
+              <a:rPr lang="en-IN" sz="2000" dirty="0" smtClean="0"/>
+              <a:t>	Create </a:t>
+            </a:r>
+            <a:r>
+              <a:rPr lang="en-IN" sz="2000" dirty="0" err="1"/>
+              <a:t>ClusterIP</a:t>
+            </a:r>
+            <a:r>
+              <a:rPr lang="en-IN" sz="2000" dirty="0"/>
+              <a:t> for both Platform and Command Service</a:t>
+            </a:r>
+            <a:r>
+              <a:rPr lang="en-IN" sz="2000" dirty="0" smtClean="0"/>
+              <a:t>.</a:t>
+            </a:r>
+          </a:p>
+          <a:p>
+            <a:pPr marL="0" indent="0">
+              <a:buNone/>
+            </a:pPr>
+            <a:endParaRPr lang="en-IN" sz="2000" dirty="0"/>
+          </a:p>
+          <a:p>
+            <a:pPr marL="0" indent="0">
+              <a:buNone/>
+            </a:pPr>
+            <a:r>
+              <a:rPr lang="en-IN" sz="2000" dirty="0"/>
+              <a:t>Step 2</a:t>
+            </a:r>
+            <a:r>
+              <a:rPr lang="en-IN" sz="2000" dirty="0" smtClean="0"/>
+              <a:t>:</a:t>
+            </a:r>
+          </a:p>
+          <a:p>
+            <a:pPr marL="0" indent="0">
+              <a:buNone/>
+            </a:pPr>
+            <a:r>
+              <a:rPr lang="en-IN" sz="2000" dirty="0" smtClean="0"/>
+              <a:t>	Update </a:t>
+            </a:r>
+            <a:r>
+              <a:rPr lang="en-IN" sz="2000" dirty="0"/>
+              <a:t>Platform service to make a HTTP POST request to Command service using </a:t>
+            </a:r>
+            <a:r>
+              <a:rPr lang="en-IN" sz="2000" dirty="0" err="1"/>
+              <a:t>IHTTPClientFactory</a:t>
+            </a:r>
+            <a:r>
+              <a:rPr lang="en-IN" sz="2000" dirty="0"/>
+              <a:t>. Use Command Service’s </a:t>
+            </a:r>
+            <a:r>
+              <a:rPr lang="en-IN" sz="2000" dirty="0" err="1"/>
+              <a:t>ClusterIP</a:t>
+            </a:r>
+            <a:r>
+              <a:rPr lang="en-IN" sz="2000" dirty="0"/>
+              <a:t> name as URI for making HTTP Post request.</a:t>
+            </a:r>
+            <a:endParaRPr lang="en-IN" sz="2000" dirty="0"/>
+          </a:p>
+        </p:txBody>
+      </p:sp>
+    </p:spTree>
+    <p:extLst>
+      <p:ext uri="{BB962C8B-B14F-4D97-AF65-F5344CB8AC3E}">
+        <p14:creationId xmlns:p14="http://schemas.microsoft.com/office/powerpoint/2010/main" val="1965287074"/>
       </p:ext>
     </p:extLst>
   </p:cSld>
@@ -4401,4 +8313,461 @@
   <a:objectDefaults/>
   <a:extraClrSchemeLst/>
 </a:theme>
+</file>
+
+<file path=ppt/theme/theme2.xml><?xml version="1.0" encoding="utf-8"?>
+<a:theme xmlns:a="http://schemas.openxmlformats.org/drawingml/2006/main" name="Office Theme">
+  <a:themeElements>
+    <a:clrScheme name="Office">
+      <a:dk1>
+        <a:sysClr val="windowText" lastClr="000000"/>
+      </a:dk1>
+      <a:lt1>
+        <a:sysClr val="window" lastClr="FFFFFF"/>
+      </a:lt1>
+      <a:dk2>
+        <a:srgbClr val="1F497D"/>
+      </a:dk2>
+      <a:lt2>
+        <a:srgbClr val="EEECE1"/>
+      </a:lt2>
+      <a:accent1>
+        <a:srgbClr val="4F81BD"/>
+      </a:accent1>
+      <a:accent2>
+        <a:srgbClr val="C0504D"/>
+      </a:accent2>
+      <a:accent3>
+        <a:srgbClr val="9BBB59"/>
+      </a:accent3>
+      <a:accent4>
+        <a:srgbClr val="8064A2"/>
+      </a:accent4>
+      <a:accent5>
+        <a:srgbClr val="4BACC6"/>
+      </a:accent5>
+      <a:accent6>
+        <a:srgbClr val="F79646"/>
+      </a:accent6>
+      <a:hlink>
+        <a:srgbClr val="0000FF"/>
+      </a:hlink>
+      <a:folHlink>
+        <a:srgbClr val="800080"/>
+      </a:folHlink>
+    </a:clrScheme>
+    <a:fontScheme name="Office">
+      <a:majorFont>
+        <a:latin typeface="Calibri"/>
+        <a:ea typeface=""/>
+        <a:cs typeface=""/>
+        <a:font script="Jpan" typeface="ＭＳ Ｐゴシック"/>
+        <a:font script="Hang" typeface="맑은 고딕"/>
+        <a:font script="Hans" typeface="宋体"/>
+        <a:font script="Hant" typeface="新細明體"/>
+        <a:font script="Arab" typeface="Times New Roman"/>
+        <a:font script="Hebr" typeface="Times New Roman"/>
+        <a:font script="Thai" typeface="Angsana New"/>
+        <a:font script="Ethi" typeface="Nyala"/>
+        <a:font script="Beng" typeface="Vrinda"/>
+        <a:font script="Gujr" typeface="Shruti"/>
+        <a:font script="Khmr" typeface="MoolBoran"/>
+        <a:font script="Knda" typeface="Tunga"/>
+        <a:font script="Guru" typeface="Raavi"/>
+        <a:font script="Cans" typeface="Euphemia"/>
+        <a:font script="Cher" typeface="Plantagenet Cherokee"/>
+        <a:font script="Yiii" typeface="Microsoft Yi Baiti"/>
+        <a:font script="Tibt" typeface="Microsoft Himalaya"/>
+        <a:font script="Thaa" typeface="MV Boli"/>
+        <a:font script="Deva" typeface="Mangal"/>
+        <a:font script="Telu" typeface="Gautami"/>
+        <a:font script="Taml" typeface="Latha"/>
+        <a:font script="Syrc" typeface="Estrangelo Edessa"/>
+        <a:font script="Orya" typeface="Kalinga"/>
+        <a:font script="Mlym" typeface="Kartika"/>
+        <a:font script="Laoo" typeface="DokChampa"/>
+        <a:font script="Sinh" typeface="Iskoola Pota"/>
+        <a:font script="Mong" typeface="Mongolian Baiti"/>
+        <a:font script="Viet" typeface="Times New Roman"/>
+        <a:font script="Uigh" typeface="Microsoft Uighur"/>
+        <a:font script="Geor" typeface="Sylfaen"/>
+      </a:majorFont>
+      <a:minorFont>
+        <a:latin typeface="Calibri"/>
+        <a:ea typeface=""/>
+        <a:cs typeface=""/>
+        <a:font script="Jpan" typeface="ＭＳ Ｐゴシック"/>
+        <a:font script="Hang" typeface="맑은 고딕"/>
+        <a:font script="Hans" typeface="宋体"/>
+        <a:font script="Hant" typeface="新細明體"/>
+        <a:font script="Arab" typeface="Arial"/>
+        <a:font script="Hebr" typeface="Arial"/>
+        <a:font script="Thai" typeface="Cordia New"/>
+        <a:font script="Ethi" typeface="Nyala"/>
+        <a:font script="Beng" typeface="Vrinda"/>
+        <a:font script="Gujr" typeface="Shruti"/>
+        <a:font script="Khmr" typeface="DaunPenh"/>
+        <a:font script="Knda" typeface="Tunga"/>
+        <a:font script="Guru" typeface="Raavi"/>
+        <a:font script="Cans" typeface="Euphemia"/>
+        <a:font script="Cher" typeface="Plantagenet Cherokee"/>
+        <a:font script="Yiii" typeface="Microsoft Yi Baiti"/>
+        <a:font script="Tibt" typeface="Microsoft Himalaya"/>
+        <a:font script="Thaa" typeface="MV Boli"/>
+        <a:font script="Deva" typeface="Mangal"/>
+        <a:font script="Telu" typeface="Gautami"/>
+        <a:font script="Taml" typeface="Latha"/>
+        <a:font script="Syrc" typeface="Estrangelo Edessa"/>
+        <a:font script="Orya" typeface="Kalinga"/>
+        <a:font script="Mlym" typeface="Kartika"/>
+        <a:font script="Laoo" typeface="DokChampa"/>
+        <a:font script="Sinh" typeface="Iskoola Pota"/>
+        <a:font script="Mong" typeface="Mongolian Baiti"/>
+        <a:font script="Viet" typeface="Arial"/>
+        <a:font script="Uigh" typeface="Microsoft Uighur"/>
+        <a:font script="Geor" typeface="Sylfaen"/>
+      </a:minorFont>
+    </a:fontScheme>
+    <a:fmtScheme name="Office">
+      <a:fillStyleLst>
+        <a:solidFill>
+          <a:schemeClr val="phClr"/>
+        </a:solidFill>
+        <a:gradFill rotWithShape="1">
+          <a:gsLst>
+            <a:gs pos="0">
+              <a:schemeClr val="phClr">
+                <a:tint val="50000"/>
+                <a:satMod val="300000"/>
+              </a:schemeClr>
+            </a:gs>
+            <a:gs pos="35000">
+              <a:schemeClr val="phClr">
+                <a:tint val="37000"/>
+                <a:satMod val="300000"/>
+              </a:schemeClr>
+            </a:gs>
+            <a:gs pos="100000">
+              <a:schemeClr val="phClr">
+                <a:tint val="15000"/>
+                <a:satMod val="350000"/>
+              </a:schemeClr>
+            </a:gs>
+          </a:gsLst>
+          <a:lin ang="16200000" scaled="1"/>
+        </a:gradFill>
+        <a:gradFill rotWithShape="1">
+          <a:gsLst>
+            <a:gs pos="0">
+              <a:schemeClr val="phClr">
+                <a:shade val="51000"/>
+                <a:satMod val="130000"/>
+              </a:schemeClr>
+            </a:gs>
+            <a:gs pos="80000">
+              <a:schemeClr val="phClr">
+                <a:shade val="93000"/>
+                <a:satMod val="130000"/>
+              </a:schemeClr>
+            </a:gs>
+            <a:gs pos="100000">
+              <a:schemeClr val="phClr">
+                <a:shade val="94000"/>
+                <a:satMod val="135000"/>
+              </a:schemeClr>
+            </a:gs>
+          </a:gsLst>
+          <a:lin ang="16200000" scaled="0"/>
+        </a:gradFill>
+      </a:fillStyleLst>
+      <a:lnStyleLst>
+        <a:ln w="9525" cap="flat" cmpd="sng" algn="ctr">
+          <a:solidFill>
+            <a:schemeClr val="phClr">
+              <a:shade val="95000"/>
+              <a:satMod val="105000"/>
+            </a:schemeClr>
+          </a:solidFill>
+          <a:prstDash val="solid"/>
+        </a:ln>
+        <a:ln w="25400" cap="flat" cmpd="sng" algn="ctr">
+          <a:solidFill>
+            <a:schemeClr val="phClr"/>
+          </a:solidFill>
+          <a:prstDash val="solid"/>
+        </a:ln>
+        <a:ln w="38100" cap="flat" cmpd="sng" algn="ctr">
+          <a:solidFill>
+            <a:schemeClr val="phClr"/>
+          </a:solidFill>
+          <a:prstDash val="solid"/>
+        </a:ln>
+      </a:lnStyleLst>
+      <a:effectStyleLst>
+        <a:effectStyle>
+          <a:effectLst>
+            <a:outerShdw blurRad="40000" dist="20000" dir="5400000" rotWithShape="0">
+              <a:srgbClr val="000000">
+                <a:alpha val="38000"/>
+              </a:srgbClr>
+            </a:outerShdw>
+          </a:effectLst>
+        </a:effectStyle>
+        <a:effectStyle>
+          <a:effectLst>
+            <a:outerShdw blurRad="40000" dist="23000" dir="5400000" rotWithShape="0">
+              <a:srgbClr val="000000">
+                <a:alpha val="35000"/>
+              </a:srgbClr>
+            </a:outerShdw>
+          </a:effectLst>
+        </a:effectStyle>
+        <a:effectStyle>
+          <a:effectLst>
+            <a:outerShdw blurRad="40000" dist="23000" dir="5400000" rotWithShape="0">
+              <a:srgbClr val="000000">
+                <a:alpha val="35000"/>
+              </a:srgbClr>
+            </a:outerShdw>
+          </a:effectLst>
+          <a:scene3d>
+            <a:camera prst="orthographicFront">
+              <a:rot lat="0" lon="0" rev="0"/>
+            </a:camera>
+            <a:lightRig rig="threePt" dir="t">
+              <a:rot lat="0" lon="0" rev="1200000"/>
+            </a:lightRig>
+          </a:scene3d>
+          <a:sp3d>
+            <a:bevelT w="63500" h="25400"/>
+          </a:sp3d>
+        </a:effectStyle>
+      </a:effectStyleLst>
+      <a:bgFillStyleLst>
+        <a:solidFill>
+          <a:schemeClr val="phClr"/>
+        </a:solidFill>
+        <a:gradFill rotWithShape="1">
+          <a:gsLst>
+            <a:gs pos="0">
+              <a:schemeClr val="phClr">
+                <a:tint val="40000"/>
+                <a:satMod val="350000"/>
+              </a:schemeClr>
+            </a:gs>
+            <a:gs pos="40000">
+              <a:schemeClr val="phClr">
+                <a:tint val="45000"/>
+                <a:shade val="99000"/>
+                <a:satMod val="350000"/>
+              </a:schemeClr>
+            </a:gs>
+            <a:gs pos="100000">
+              <a:schemeClr val="phClr">
+                <a:shade val="20000"/>
+                <a:satMod val="255000"/>
+              </a:schemeClr>
+            </a:gs>
+          </a:gsLst>
+          <a:path path="circle">
+            <a:fillToRect l="50000" t="-80000" r="50000" b="180000"/>
+          </a:path>
+        </a:gradFill>
+        <a:gradFill rotWithShape="1">
+          <a:gsLst>
+            <a:gs pos="0">
+              <a:schemeClr val="phClr">
+                <a:tint val="80000"/>
+                <a:satMod val="300000"/>
+              </a:schemeClr>
+            </a:gs>
+            <a:gs pos="100000">
+              <a:schemeClr val="phClr">
+                <a:shade val="30000"/>
+                <a:satMod val="200000"/>
+              </a:schemeClr>
+            </a:gs>
+          </a:gsLst>
+          <a:path path="circle">
+            <a:fillToRect l="50000" t="50000" r="50000" b="50000"/>
+          </a:path>
+        </a:gradFill>
+      </a:bgFillStyleLst>
+    </a:fmtScheme>
+  </a:themeElements>
+  <a:objectDefaults/>
+  <a:extraClrSchemeLst/>
+</a:theme>
+</file>
+
+<file path=ppt/theme/themeOverride1.xml><?xml version="1.0" encoding="utf-8"?>
+<a:themeOverride xmlns:a="http://schemas.openxmlformats.org/drawingml/2006/main">
+  <a:clrScheme name="Office">
+    <a:dk1>
+      <a:sysClr val="windowText" lastClr="000000"/>
+    </a:dk1>
+    <a:lt1>
+      <a:sysClr val="window" lastClr="FFFFFF"/>
+    </a:lt1>
+    <a:dk2>
+      <a:srgbClr val="1F497D"/>
+    </a:dk2>
+    <a:lt2>
+      <a:srgbClr val="EEECE1"/>
+    </a:lt2>
+    <a:accent1>
+      <a:srgbClr val="4F81BD"/>
+    </a:accent1>
+    <a:accent2>
+      <a:srgbClr val="C0504D"/>
+    </a:accent2>
+    <a:accent3>
+      <a:srgbClr val="9BBB59"/>
+    </a:accent3>
+    <a:accent4>
+      <a:srgbClr val="8064A2"/>
+    </a:accent4>
+    <a:accent5>
+      <a:srgbClr val="4BACC6"/>
+    </a:accent5>
+    <a:accent6>
+      <a:srgbClr val="F79646"/>
+    </a:accent6>
+    <a:hlink>
+      <a:srgbClr val="0000FF"/>
+    </a:hlink>
+    <a:folHlink>
+      <a:srgbClr val="800080"/>
+    </a:folHlink>
+  </a:clrScheme>
+</a:themeOverride>
+</file>
+
+<file path=ppt/theme/themeOverride2.xml><?xml version="1.0" encoding="utf-8"?>
+<a:themeOverride xmlns:a="http://schemas.openxmlformats.org/drawingml/2006/main">
+  <a:clrScheme name="Office">
+    <a:dk1>
+      <a:sysClr val="windowText" lastClr="000000"/>
+    </a:dk1>
+    <a:lt1>
+      <a:sysClr val="window" lastClr="FFFFFF"/>
+    </a:lt1>
+    <a:dk2>
+      <a:srgbClr val="1F497D"/>
+    </a:dk2>
+    <a:lt2>
+      <a:srgbClr val="EEECE1"/>
+    </a:lt2>
+    <a:accent1>
+      <a:srgbClr val="4F81BD"/>
+    </a:accent1>
+    <a:accent2>
+      <a:srgbClr val="C0504D"/>
+    </a:accent2>
+    <a:accent3>
+      <a:srgbClr val="9BBB59"/>
+    </a:accent3>
+    <a:accent4>
+      <a:srgbClr val="8064A2"/>
+    </a:accent4>
+    <a:accent5>
+      <a:srgbClr val="4BACC6"/>
+    </a:accent5>
+    <a:accent6>
+      <a:srgbClr val="F79646"/>
+    </a:accent6>
+    <a:hlink>
+      <a:srgbClr val="0000FF"/>
+    </a:hlink>
+    <a:folHlink>
+      <a:srgbClr val="800080"/>
+    </a:folHlink>
+  </a:clrScheme>
+</a:themeOverride>
+</file>
+
+<file path=ppt/theme/themeOverride3.xml><?xml version="1.0" encoding="utf-8"?>
+<a:themeOverride xmlns:a="http://schemas.openxmlformats.org/drawingml/2006/main">
+  <a:clrScheme name="Office">
+    <a:dk1>
+      <a:sysClr val="windowText" lastClr="000000"/>
+    </a:dk1>
+    <a:lt1>
+      <a:sysClr val="window" lastClr="FFFFFF"/>
+    </a:lt1>
+    <a:dk2>
+      <a:srgbClr val="1F497D"/>
+    </a:dk2>
+    <a:lt2>
+      <a:srgbClr val="EEECE1"/>
+    </a:lt2>
+    <a:accent1>
+      <a:srgbClr val="4F81BD"/>
+    </a:accent1>
+    <a:accent2>
+      <a:srgbClr val="C0504D"/>
+    </a:accent2>
+    <a:accent3>
+      <a:srgbClr val="9BBB59"/>
+    </a:accent3>
+    <a:accent4>
+      <a:srgbClr val="8064A2"/>
+    </a:accent4>
+    <a:accent5>
+      <a:srgbClr val="4BACC6"/>
+    </a:accent5>
+    <a:accent6>
+      <a:srgbClr val="F79646"/>
+    </a:accent6>
+    <a:hlink>
+      <a:srgbClr val="0000FF"/>
+    </a:hlink>
+    <a:folHlink>
+      <a:srgbClr val="800080"/>
+    </a:folHlink>
+  </a:clrScheme>
+</a:themeOverride>
+</file>
+
+<file path=ppt/theme/themeOverride4.xml><?xml version="1.0" encoding="utf-8"?>
+<a:themeOverride xmlns:a="http://schemas.openxmlformats.org/drawingml/2006/main">
+  <a:clrScheme name="Office">
+    <a:dk1>
+      <a:sysClr val="windowText" lastClr="000000"/>
+    </a:dk1>
+    <a:lt1>
+      <a:sysClr val="window" lastClr="FFFFFF"/>
+    </a:lt1>
+    <a:dk2>
+      <a:srgbClr val="1F497D"/>
+    </a:dk2>
+    <a:lt2>
+      <a:srgbClr val="EEECE1"/>
+    </a:lt2>
+    <a:accent1>
+      <a:srgbClr val="4F81BD"/>
+    </a:accent1>
+    <a:accent2>
+      <a:srgbClr val="C0504D"/>
+    </a:accent2>
+    <a:accent3>
+      <a:srgbClr val="9BBB59"/>
+    </a:accent3>
+    <a:accent4>
+      <a:srgbClr val="8064A2"/>
+    </a:accent4>
+    <a:accent5>
+      <a:srgbClr val="4BACC6"/>
+    </a:accent5>
+    <a:accent6>
+      <a:srgbClr val="F79646"/>
+    </a:accent6>
+    <a:hlink>
+      <a:srgbClr val="0000FF"/>
+    </a:hlink>
+    <a:folHlink>
+      <a:srgbClr val="800080"/>
+    </a:folHlink>
+  </a:clrScheme>
+</a:themeOverride>
 </file>
</xml_diff>